<commit_message>
Start end to end picture
</commit_message>
<xml_diff>
--- a/Presentation/Presentation.pptx
+++ b/Presentation/Presentation.pptx
@@ -5,26 +5,27 @@
     <p:sldMasterId id="2147483660" r:id="rId1"/>
   </p:sldMasterIdLst>
   <p:notesMasterIdLst>
-    <p:notesMasterId r:id="rId16"/>
+    <p:notesMasterId r:id="rId17"/>
   </p:notesMasterIdLst>
   <p:handoutMasterIdLst>
-    <p:handoutMasterId r:id="rId17"/>
+    <p:handoutMasterId r:id="rId18"/>
   </p:handoutMasterIdLst>
   <p:sldIdLst>
     <p:sldId id="379" r:id="rId2"/>
     <p:sldId id="413" r:id="rId3"/>
     <p:sldId id="399" r:id="rId4"/>
-    <p:sldId id="414" r:id="rId5"/>
-    <p:sldId id="415" r:id="rId6"/>
-    <p:sldId id="404" r:id="rId7"/>
-    <p:sldId id="406" r:id="rId8"/>
-    <p:sldId id="407" r:id="rId9"/>
-    <p:sldId id="408" r:id="rId10"/>
-    <p:sldId id="409" r:id="rId11"/>
-    <p:sldId id="405" r:id="rId12"/>
-    <p:sldId id="410" r:id="rId13"/>
-    <p:sldId id="411" r:id="rId14"/>
-    <p:sldId id="412" r:id="rId15"/>
+    <p:sldId id="416" r:id="rId5"/>
+    <p:sldId id="414" r:id="rId6"/>
+    <p:sldId id="415" r:id="rId7"/>
+    <p:sldId id="404" r:id="rId8"/>
+    <p:sldId id="406" r:id="rId9"/>
+    <p:sldId id="407" r:id="rId10"/>
+    <p:sldId id="408" r:id="rId11"/>
+    <p:sldId id="409" r:id="rId12"/>
+    <p:sldId id="405" r:id="rId13"/>
+    <p:sldId id="410" r:id="rId14"/>
+    <p:sldId id="411" r:id="rId15"/>
+    <p:sldId id="412" r:id="rId16"/>
   </p:sldIdLst>
   <p:sldSz cx="9144000" cy="6858000" type="screen4x3"/>
   <p:notesSz cx="6794500" cy="9931400"/>
@@ -280,7 +281,7 @@
           <a:p>
             <a:fld id="{C8DBE15E-223F-41F1-9F94-2D73857FC7BA}" type="datetimeFigureOut">
               <a:rPr lang="it-IT" smtClean="0"/>
-              <a:t>26/06/2020</a:t>
+              <a:t>16/07/2020</a:t>
             </a:fld>
             <a:endParaRPr lang="it-IT"/>
           </a:p>
@@ -493,7 +494,7 @@
             <a:fld id="{2AD04753-9C7D-45A1-B290-034DCD5D3C5A}" type="datetimeFigureOut">
               <a:rPr lang="it-IT" altLang="it-IT"/>
               <a:pPr/>
-              <a:t>26/06/2020</a:t>
+              <a:t>16/07/2020</a:t>
             </a:fld>
             <a:endParaRPr lang="it-IT" altLang="it-IT"/>
           </a:p>
@@ -6452,7 +6453,7 @@
                 </a:solidFill>
                 <a:latin typeface="Tw Cen MT" panose="020B0602020104020603" pitchFamily="34" charset="0"/>
               </a:rPr>
-              <a:t>Training Architecture</a:t>
+              <a:t>Production Architecture</a:t>
             </a:r>
           </a:p>
         </p:txBody>
@@ -6540,7 +6541,7 @@
                 </a:solidFill>
                 <a:latin typeface="Garamond" panose="02020404030301010803" pitchFamily="18" charset="0"/>
               </a:rPr>
-              <a:t>8</a:t>
+              <a:t>7</a:t>
             </a:r>
             <a:endParaRPr lang="en-US" altLang="it-IT" sz="1800" dirty="0">
               <a:solidFill>
@@ -6611,8 +6612,8 @@
         </p:nvSpPr>
         <p:spPr bwMode="auto">
           <a:xfrm>
-            <a:off x="307910" y="1028296"/>
-            <a:ext cx="8599487" cy="961131"/>
+            <a:off x="272255" y="1181692"/>
+            <a:ext cx="8599487" cy="5073389"/>
           </a:xfrm>
           <a:prstGeom prst="rect">
             <a:avLst/>
@@ -6751,61 +6752,7 @@
               <a:buFont typeface="Arial" panose="020B0604020202020204" pitchFamily="34" charset="0"/>
               <a:buChar char="•"/>
             </a:pPr>
-            <a:r>
-              <a:rPr lang="en-US" altLang="it-IT" sz="1800" dirty="0">
-                <a:solidFill>
-                  <a:srgbClr val="000000"/>
-                </a:solidFill>
-                <a:latin typeface="Garamond" panose="02020404030301010803" pitchFamily="18" charset="0"/>
-              </a:rPr>
-              <a:t>Extract 100 pictures from each MRI</a:t>
-            </a:r>
-          </a:p>
-          <a:p>
-            <a:pPr marL="342900" indent="-342900" eaLnBrk="1" hangingPunct="1">
-              <a:spcBef>
-                <a:spcPct val="20000"/>
-              </a:spcBef>
-              <a:buFont typeface="Arial" panose="020B0604020202020204" pitchFamily="34" charset="0"/>
-              <a:buChar char="•"/>
-            </a:pPr>
-            <a:r>
-              <a:rPr lang="en-US" altLang="it-IT" sz="1800" dirty="0">
-                <a:solidFill>
-                  <a:srgbClr val="000000"/>
-                </a:solidFill>
-                <a:latin typeface="Garamond" panose="02020404030301010803" pitchFamily="18" charset="0"/>
-              </a:rPr>
-              <a:t>Perform some data augmentation</a:t>
-            </a:r>
-          </a:p>
-          <a:p>
-            <a:pPr marL="342900" indent="-342900" eaLnBrk="1" hangingPunct="1">
-              <a:spcBef>
-                <a:spcPct val="20000"/>
-              </a:spcBef>
-              <a:buFont typeface="Arial" panose="020B0604020202020204" pitchFamily="34" charset="0"/>
-              <a:buChar char="•"/>
-            </a:pPr>
-            <a:r>
-              <a:rPr lang="en-US" altLang="it-IT" sz="1800" dirty="0">
-                <a:solidFill>
-                  <a:srgbClr val="000000"/>
-                </a:solidFill>
-                <a:latin typeface="Garamond" panose="02020404030301010803" pitchFamily="18" charset="0"/>
-              </a:rPr>
-              <a:t>Fed them into </a:t>
-            </a:r>
-            <a:r>
-              <a:rPr lang="en-US" altLang="it-IT" sz="1800" dirty="0" err="1">
-                <a:solidFill>
-                  <a:srgbClr val="000000"/>
-                </a:solidFill>
-                <a:latin typeface="Garamond" panose="02020404030301010803" pitchFamily="18" charset="0"/>
-              </a:rPr>
-              <a:t>AlexNet</a:t>
-            </a:r>
-            <a:endParaRPr lang="en-US" altLang="it-IT" sz="1800" dirty="0">
+            <a:endParaRPr lang="en-US" altLang="it-IT" sz="2200" dirty="0">
               <a:solidFill>
                 <a:srgbClr val="000000"/>
               </a:solidFill>
@@ -6819,7 +6766,7 @@
           <p:cNvPr id="3" name="Immagine 2" descr="Immagine che contiene mappa, testo&#10;&#10;Descrizione generata automaticamente">
             <a:extLst>
               <a:ext uri="{FF2B5EF4-FFF2-40B4-BE49-F238E27FC236}">
-                <a16:creationId xmlns:a16="http://schemas.microsoft.com/office/drawing/2014/main" id="{602060BF-8271-4B4B-AD84-B1F7B460A4DE}"/>
+                <a16:creationId xmlns:a16="http://schemas.microsoft.com/office/drawing/2014/main" id="{B806BBAF-5620-423B-81CA-68D66BFD4B75}"/>
               </a:ext>
             </a:extLst>
           </p:cNvPr>
@@ -6830,13 +6777,13 @@
         </p:nvPicPr>
         <p:blipFill rotWithShape="1">
           <a:blip r:embed="rId2"/>
-          <a:srcRect t="73591" r="25030"/>
+          <a:srcRect t="26026" b="32662"/>
           <a:stretch/>
         </p:blipFill>
         <p:spPr>
           <a:xfrm>
-            <a:off x="1258347" y="1989427"/>
-            <a:ext cx="6698612" cy="4419050"/>
+            <a:off x="931653" y="1112068"/>
+            <a:ext cx="7010817" cy="5424286"/>
           </a:xfrm>
           <a:prstGeom prst="rect">
             <a:avLst/>
@@ -6846,7 +6793,7 @@
     </p:spTree>
     <p:extLst>
       <p:ext uri="{BB962C8B-B14F-4D97-AF65-F5344CB8AC3E}">
-        <p14:creationId xmlns:p14="http://schemas.microsoft.com/office/powerpoint/2010/main" val="2697135185"/>
+        <p14:creationId xmlns:p14="http://schemas.microsoft.com/office/powerpoint/2010/main" val="3930370613"/>
       </p:ext>
     </p:extLst>
   </p:cSld>
@@ -7036,7 +6983,7 @@
                 </a:solidFill>
                 <a:latin typeface="Tw Cen MT" panose="020B0602020104020603" pitchFamily="34" charset="0"/>
               </a:rPr>
-              <a:t>Architecture</a:t>
+              <a:t>Training Architecture</a:t>
             </a:r>
           </a:p>
         </p:txBody>
@@ -7124,7 +7071,7 @@
                 </a:solidFill>
                 <a:latin typeface="Garamond" panose="02020404030301010803" pitchFamily="18" charset="0"/>
               </a:rPr>
-              <a:t>9</a:t>
+              <a:t>8</a:t>
             </a:r>
             <a:endParaRPr lang="en-US" altLang="it-IT" sz="1800" dirty="0">
               <a:solidFill>
@@ -7195,8 +7142,8 @@
         </p:nvSpPr>
         <p:spPr bwMode="auto">
           <a:xfrm>
-            <a:off x="272255" y="1181692"/>
-            <a:ext cx="8599487" cy="5073389"/>
+            <a:off x="307910" y="1028296"/>
+            <a:ext cx="8599487" cy="961131"/>
           </a:xfrm>
           <a:prstGeom prst="rect">
             <a:avLst/>
@@ -7328,311 +7275,109 @@
             </a:lvl9pPr>
           </a:lstStyle>
           <a:p>
-            <a:pPr eaLnBrk="1" hangingPunct="1">
+            <a:pPr marL="342900" indent="-342900" eaLnBrk="1" hangingPunct="1">
               <a:spcBef>
                 <a:spcPct val="20000"/>
               </a:spcBef>
+              <a:buFont typeface="Arial" panose="020B0604020202020204" pitchFamily="34" charset="0"/>
+              <a:buChar char="•"/>
             </a:pPr>
             <a:r>
-              <a:rPr lang="en-US" altLang="it-IT" sz="2200" dirty="0">
-                <a:solidFill>
-                  <a:srgbClr val="000000"/>
-                </a:solidFill>
-                <a:latin typeface="Garamond" panose="02020404030301010803" pitchFamily="18" charset="0"/>
-              </a:rPr>
-              <a:t>A key challenge in applying CNNs is that sufficient training data are not always available in medical images. To avoid Over/Under-fitting:</a:t>
-            </a:r>
-            <a:endParaRPr lang="en-US" altLang="it-IT" sz="2200" b="1" dirty="0">
+              <a:rPr lang="en-US" altLang="it-IT" sz="1800" dirty="0">
+                <a:solidFill>
+                  <a:srgbClr val="000000"/>
+                </a:solidFill>
+                <a:latin typeface="Garamond" panose="02020404030301010803" pitchFamily="18" charset="0"/>
+              </a:rPr>
+              <a:t>Extract 100 pictures from each MRI</a:t>
+            </a:r>
+          </a:p>
+          <a:p>
+            <a:pPr marL="342900" indent="-342900" eaLnBrk="1" hangingPunct="1">
+              <a:spcBef>
+                <a:spcPct val="20000"/>
+              </a:spcBef>
+              <a:buFont typeface="Arial" panose="020B0604020202020204" pitchFamily="34" charset="0"/>
+              <a:buChar char="•"/>
+            </a:pPr>
+            <a:r>
+              <a:rPr lang="en-US" altLang="it-IT" sz="1800" dirty="0">
+                <a:solidFill>
+                  <a:srgbClr val="000000"/>
+                </a:solidFill>
+                <a:latin typeface="Garamond" panose="02020404030301010803" pitchFamily="18" charset="0"/>
+              </a:rPr>
+              <a:t>Perform some data augmentation</a:t>
+            </a:r>
+          </a:p>
+          <a:p>
+            <a:pPr marL="342900" indent="-342900" eaLnBrk="1" hangingPunct="1">
+              <a:spcBef>
+                <a:spcPct val="20000"/>
+              </a:spcBef>
+              <a:buFont typeface="Arial" panose="020B0604020202020204" pitchFamily="34" charset="0"/>
+              <a:buChar char="•"/>
+            </a:pPr>
+            <a:r>
+              <a:rPr lang="en-US" altLang="it-IT" sz="1800" dirty="0">
+                <a:solidFill>
+                  <a:srgbClr val="000000"/>
+                </a:solidFill>
+                <a:latin typeface="Garamond" panose="02020404030301010803" pitchFamily="18" charset="0"/>
+              </a:rPr>
+              <a:t>Fed them into </a:t>
+            </a:r>
+            <a:r>
+              <a:rPr lang="en-US" altLang="it-IT" sz="1800" dirty="0" err="1">
+                <a:solidFill>
+                  <a:srgbClr val="000000"/>
+                </a:solidFill>
+                <a:latin typeface="Garamond" panose="02020404030301010803" pitchFamily="18" charset="0"/>
+              </a:rPr>
+              <a:t>AlexNet</a:t>
+            </a:r>
+            <a:endParaRPr lang="en-US" altLang="it-IT" sz="1800" dirty="0">
               <a:solidFill>
                 <a:srgbClr val="000000"/>
               </a:solidFill>
               <a:latin typeface="Garamond" panose="02020404030301010803" pitchFamily="18" charset="0"/>
             </a:endParaRPr>
           </a:p>
-          <a:p>
-            <a:pPr marL="342900" indent="-342900" eaLnBrk="1" hangingPunct="1">
-              <a:spcBef>
-                <a:spcPct val="20000"/>
-              </a:spcBef>
-              <a:buFont typeface="Arial" panose="020B0604020202020204" pitchFamily="34" charset="0"/>
-              <a:buChar char="•"/>
-            </a:pPr>
-            <a:r>
-              <a:rPr lang="en-US" altLang="it-IT" sz="2200" b="1" dirty="0">
-                <a:solidFill>
-                  <a:srgbClr val="000000"/>
-                </a:solidFill>
-                <a:latin typeface="Garamond" panose="02020404030301010803" pitchFamily="18" charset="0"/>
-              </a:rPr>
-              <a:t>Data Augmentation: </a:t>
-            </a:r>
-            <a:r>
-              <a:rPr lang="en-US" altLang="it-IT" sz="2200" dirty="0">
-                <a:solidFill>
-                  <a:srgbClr val="000000"/>
-                </a:solidFill>
-                <a:latin typeface="Garamond" panose="02020404030301010803" pitchFamily="18" charset="0"/>
-              </a:rPr>
-              <a:t>In case of medical images this often comes down to </a:t>
-            </a:r>
-            <a:r>
-              <a:rPr lang="en-US" altLang="it-IT" sz="2200" b="1" dirty="0">
-                <a:solidFill>
-                  <a:srgbClr val="000000"/>
-                </a:solidFill>
-                <a:latin typeface="Garamond" panose="02020404030301010803" pitchFamily="18" charset="0"/>
-              </a:rPr>
-              <a:t>mirror flipping</a:t>
-            </a:r>
-            <a:r>
-              <a:rPr lang="en-US" altLang="it-IT" sz="2200" dirty="0">
-                <a:solidFill>
-                  <a:srgbClr val="000000"/>
-                </a:solidFill>
-                <a:latin typeface="Garamond" panose="02020404030301010803" pitchFamily="18" charset="0"/>
-              </a:rPr>
-              <a:t>, small-magnitude translations, weak Gaussian blurring, </a:t>
-            </a:r>
-            <a:r>
-              <a:rPr lang="en-US" altLang="it-IT" sz="2200" b="1" dirty="0">
-                <a:solidFill>
-                  <a:srgbClr val="000000"/>
-                </a:solidFill>
-                <a:latin typeface="Garamond" panose="02020404030301010803" pitchFamily="18" charset="0"/>
-              </a:rPr>
-              <a:t>brightness augmentation </a:t>
-            </a:r>
-            <a:r>
-              <a:rPr lang="en-US" altLang="it-IT" sz="2200" dirty="0">
-                <a:solidFill>
-                  <a:srgbClr val="000000"/>
-                </a:solidFill>
-                <a:latin typeface="Garamond" panose="02020404030301010803" pitchFamily="18" charset="0"/>
-              </a:rPr>
-              <a:t>and </a:t>
-            </a:r>
-            <a:r>
-              <a:rPr lang="en-US" altLang="it-IT" sz="2200" b="1" dirty="0">
-                <a:solidFill>
-                  <a:srgbClr val="000000"/>
-                </a:solidFill>
-                <a:latin typeface="Garamond" panose="02020404030301010803" pitchFamily="18" charset="0"/>
-              </a:rPr>
-              <a:t>shadow augmentation</a:t>
-            </a:r>
-            <a:r>
-              <a:rPr lang="en-US" altLang="it-IT" sz="2200" dirty="0">
-                <a:solidFill>
-                  <a:srgbClr val="000000"/>
-                </a:solidFill>
-                <a:latin typeface="Garamond" panose="02020404030301010803" pitchFamily="18" charset="0"/>
-              </a:rPr>
-              <a:t>.</a:t>
-            </a:r>
-          </a:p>
-          <a:p>
-            <a:pPr marL="342900" indent="-342900" eaLnBrk="1" hangingPunct="1">
-              <a:spcBef>
-                <a:spcPct val="20000"/>
-              </a:spcBef>
-              <a:buFont typeface="Arial" panose="020B0604020202020204" pitchFamily="34" charset="0"/>
-              <a:buChar char="•"/>
-            </a:pPr>
-            <a:r>
-              <a:rPr lang="en-US" altLang="it-IT" sz="2200" b="1" dirty="0" err="1">
-                <a:solidFill>
-                  <a:srgbClr val="000000"/>
-                </a:solidFill>
-                <a:latin typeface="Garamond" panose="02020404030301010803" pitchFamily="18" charset="0"/>
-              </a:rPr>
-              <a:t>TransferLearning</a:t>
-            </a:r>
-            <a:r>
-              <a:rPr lang="en-US" altLang="it-IT" sz="2200" b="1" dirty="0">
-                <a:solidFill>
-                  <a:srgbClr val="000000"/>
-                </a:solidFill>
-                <a:latin typeface="Garamond" panose="02020404030301010803" pitchFamily="18" charset="0"/>
-              </a:rPr>
-              <a:t> from </a:t>
-            </a:r>
-            <a:r>
-              <a:rPr lang="en-US" altLang="it-IT" sz="2200" b="1" dirty="0" err="1">
-                <a:solidFill>
-                  <a:srgbClr val="000000"/>
-                </a:solidFill>
-                <a:latin typeface="Garamond" panose="02020404030301010803" pitchFamily="18" charset="0"/>
-              </a:rPr>
-              <a:t>AlexNet</a:t>
-            </a:r>
-            <a:r>
-              <a:rPr lang="en-US" altLang="it-IT" sz="2200" b="1" dirty="0">
-                <a:solidFill>
-                  <a:srgbClr val="000000"/>
-                </a:solidFill>
-                <a:latin typeface="Garamond" panose="02020404030301010803" pitchFamily="18" charset="0"/>
-              </a:rPr>
-              <a:t>: training</a:t>
-            </a:r>
-            <a:r>
-              <a:rPr lang="en-US" altLang="it-IT" sz="2200" dirty="0">
-                <a:solidFill>
-                  <a:srgbClr val="000000"/>
-                </a:solidFill>
-                <a:latin typeface="Garamond" panose="02020404030301010803" pitchFamily="18" charset="0"/>
-              </a:rPr>
-              <a:t> CNN </a:t>
-            </a:r>
-            <a:r>
-              <a:rPr lang="en-US" altLang="it-IT" sz="2200" b="1" dirty="0">
-                <a:solidFill>
-                  <a:srgbClr val="000000"/>
-                </a:solidFill>
-                <a:latin typeface="Garamond" panose="02020404030301010803" pitchFamily="18" charset="0"/>
-              </a:rPr>
-              <a:t>from scratch </a:t>
-            </a:r>
-            <a:r>
-              <a:rPr lang="en-US" altLang="it-IT" sz="2200" dirty="0">
-                <a:solidFill>
-                  <a:srgbClr val="000000"/>
-                </a:solidFill>
-                <a:latin typeface="Garamond" panose="02020404030301010803" pitchFamily="18" charset="0"/>
-              </a:rPr>
-              <a:t>is usually challenging owing to the limited amount of labeled medical data. A promising alternative is to fine-tune the weights of a network that was trained using a large set of labeled natural images.</a:t>
-            </a:r>
-          </a:p>
-          <a:p>
-            <a:pPr marL="1085850" lvl="1" indent="-342900" eaLnBrk="1" hangingPunct="1">
-              <a:spcBef>
-                <a:spcPct val="20000"/>
-              </a:spcBef>
-              <a:buFont typeface="Courier New" panose="02070309020205020404" pitchFamily="49" charset="0"/>
-              <a:buChar char="o"/>
-            </a:pPr>
-            <a:r>
-              <a:rPr lang="en-US" altLang="it-IT" sz="2000" dirty="0">
-                <a:solidFill>
-                  <a:srgbClr val="000000"/>
-                </a:solidFill>
-                <a:latin typeface="Garamond" panose="02020404030301010803" pitchFamily="18" charset="0"/>
-              </a:rPr>
-              <a:t>Prof. </a:t>
-            </a:r>
-            <a:r>
-              <a:rPr lang="en-US" altLang="it-IT" sz="2000" dirty="0" err="1">
-                <a:solidFill>
-                  <a:srgbClr val="000000"/>
-                </a:solidFill>
-                <a:latin typeface="Garamond" panose="02020404030301010803" pitchFamily="18" charset="0"/>
-              </a:rPr>
-              <a:t>Tajbakhsh</a:t>
-            </a:r>
-            <a:r>
-              <a:rPr lang="en-US" altLang="it-IT" sz="2000" dirty="0">
-                <a:solidFill>
-                  <a:srgbClr val="000000"/>
-                </a:solidFill>
-                <a:latin typeface="Garamond" panose="02020404030301010803" pitchFamily="18" charset="0"/>
-              </a:rPr>
-              <a:t>, Illinois Institute of Technology: considered several medical imaging applications and investigated how the performance of </a:t>
-            </a:r>
-            <a:r>
-              <a:rPr lang="en-US" altLang="it-IT" sz="2000" b="1" dirty="0">
-                <a:solidFill>
-                  <a:srgbClr val="000000"/>
-                </a:solidFill>
-                <a:latin typeface="Garamond" panose="02020404030301010803" pitchFamily="18" charset="0"/>
-              </a:rPr>
-              <a:t>CNNs</a:t>
-            </a:r>
-            <a:r>
-              <a:rPr lang="en-US" altLang="it-IT" sz="2000" dirty="0">
-                <a:solidFill>
-                  <a:srgbClr val="000000"/>
-                </a:solidFill>
-                <a:latin typeface="Garamond" panose="02020404030301010803" pitchFamily="18" charset="0"/>
-              </a:rPr>
-              <a:t> trained </a:t>
-            </a:r>
-            <a:r>
-              <a:rPr lang="en-US" altLang="it-IT" sz="2000" b="1" dirty="0">
-                <a:solidFill>
-                  <a:srgbClr val="000000"/>
-                </a:solidFill>
-                <a:latin typeface="Garamond" panose="02020404030301010803" pitchFamily="18" charset="0"/>
-              </a:rPr>
-              <a:t>from scratch compared</a:t>
-            </a:r>
-            <a:r>
-              <a:rPr lang="en-US" altLang="it-IT" sz="2000" dirty="0">
-                <a:solidFill>
-                  <a:srgbClr val="000000"/>
-                </a:solidFill>
-                <a:latin typeface="Garamond" panose="02020404030301010803" pitchFamily="18" charset="0"/>
-              </a:rPr>
-              <a:t> with the </a:t>
-            </a:r>
-            <a:r>
-              <a:rPr lang="en-US" altLang="it-IT" sz="2000" b="1" dirty="0">
-                <a:solidFill>
-                  <a:srgbClr val="000000"/>
-                </a:solidFill>
-                <a:latin typeface="Garamond" panose="02020404030301010803" pitchFamily="18" charset="0"/>
-              </a:rPr>
-              <a:t>pre-trained</a:t>
-            </a:r>
-            <a:r>
-              <a:rPr lang="en-US" altLang="it-IT" sz="2000" dirty="0">
-                <a:solidFill>
-                  <a:srgbClr val="000000"/>
-                </a:solidFill>
-                <a:latin typeface="Garamond" panose="02020404030301010803" pitchFamily="18" charset="0"/>
-              </a:rPr>
-              <a:t> CNNs.</a:t>
-            </a:r>
-            <a:br>
-              <a:rPr lang="en-US" altLang="it-IT" sz="2000" dirty="0">
-                <a:solidFill>
-                  <a:srgbClr val="000000"/>
-                </a:solidFill>
-                <a:latin typeface="Garamond" panose="02020404030301010803" pitchFamily="18" charset="0"/>
-              </a:rPr>
-            </a:br>
-            <a:r>
-              <a:rPr lang="en-US" altLang="it-IT" sz="2000" dirty="0">
-                <a:solidFill>
-                  <a:srgbClr val="000000"/>
-                </a:solidFill>
-                <a:latin typeface="Garamond" panose="02020404030301010803" pitchFamily="18" charset="0"/>
-              </a:rPr>
-              <a:t>Their experiments demonstrated that pretrained </a:t>
-            </a:r>
-            <a:r>
-              <a:rPr lang="en-US" altLang="it-IT" sz="2000" b="1" dirty="0">
-                <a:solidFill>
-                  <a:srgbClr val="000000"/>
-                </a:solidFill>
-                <a:latin typeface="Garamond" panose="02020404030301010803" pitchFamily="18" charset="0"/>
-              </a:rPr>
-              <a:t>CNNs performed better </a:t>
-            </a:r>
-            <a:r>
-              <a:rPr lang="en-US" altLang="it-IT" sz="2000" dirty="0">
-                <a:solidFill>
-                  <a:srgbClr val="000000"/>
-                </a:solidFill>
-                <a:latin typeface="Garamond" panose="02020404030301010803" pitchFamily="18" charset="0"/>
-              </a:rPr>
-              <a:t>than CNN trained from scratch.</a:t>
-            </a:r>
-          </a:p>
-        </p:txBody>
-      </p:sp>
+        </p:txBody>
+      </p:sp>
+      <p:pic>
+        <p:nvPicPr>
+          <p:cNvPr id="3" name="Immagine 2" descr="Immagine che contiene mappa, testo&#10;&#10;Descrizione generata automaticamente">
+            <a:extLst>
+              <a:ext uri="{FF2B5EF4-FFF2-40B4-BE49-F238E27FC236}">
+                <a16:creationId xmlns:a16="http://schemas.microsoft.com/office/drawing/2014/main" id="{602060BF-8271-4B4B-AD84-B1F7B460A4DE}"/>
+              </a:ext>
+            </a:extLst>
+          </p:cNvPr>
+          <p:cNvPicPr>
+            <a:picLocks noChangeAspect="1"/>
+          </p:cNvPicPr>
+          <p:nvPr/>
+        </p:nvPicPr>
+        <p:blipFill rotWithShape="1">
+          <a:blip r:embed="rId2"/>
+          <a:srcRect t="73591" r="25030"/>
+          <a:stretch/>
+        </p:blipFill>
+        <p:spPr>
+          <a:xfrm>
+            <a:off x="1258347" y="1989427"/>
+            <a:ext cx="6698612" cy="4419050"/>
+          </a:xfrm>
+          <a:prstGeom prst="rect">
+            <a:avLst/>
+          </a:prstGeom>
+        </p:spPr>
+      </p:pic>
     </p:spTree>
     <p:extLst>
       <p:ext uri="{BB962C8B-B14F-4D97-AF65-F5344CB8AC3E}">
-        <p14:creationId xmlns:p14="http://schemas.microsoft.com/office/powerpoint/2010/main" val="2097444773"/>
+        <p14:creationId xmlns:p14="http://schemas.microsoft.com/office/powerpoint/2010/main" val="2697135185"/>
       </p:ext>
     </p:extLst>
   </p:cSld>
@@ -7822,7 +7567,7 @@
                 </a:solidFill>
                 <a:latin typeface="Tw Cen MT" panose="020B0602020104020603" pitchFamily="34" charset="0"/>
               </a:rPr>
-              <a:t>Performances</a:t>
+              <a:t>Architecture</a:t>
             </a:r>
           </a:p>
         </p:txBody>
@@ -7885,8 +7630,8 @@
         </p:nvSpPr>
         <p:spPr>
           <a:xfrm>
-            <a:off x="8670794" y="6397833"/>
-            <a:ext cx="473206" cy="461665"/>
+            <a:off x="8815064" y="6408477"/>
+            <a:ext cx="328936" cy="461665"/>
           </a:xfrm>
           <a:prstGeom prst="rect">
             <a:avLst/>
@@ -7910,8 +7655,14 @@
                 </a:solidFill>
                 <a:latin typeface="Garamond" panose="02020404030301010803" pitchFamily="18" charset="0"/>
               </a:rPr>
-              <a:t>10</a:t>
-            </a:r>
+              <a:t>9</a:t>
+            </a:r>
+            <a:endParaRPr lang="en-US" altLang="it-IT" sz="1800" dirty="0">
+              <a:solidFill>
+                <a:srgbClr val="000000"/>
+              </a:solidFill>
+              <a:latin typeface="Garamond" panose="02020404030301010803" pitchFamily="18" charset="0"/>
+            </a:endParaRPr>
           </a:p>
         </p:txBody>
       </p:sp>
@@ -7975,8 +7726,8 @@
         </p:nvSpPr>
         <p:spPr bwMode="auto">
           <a:xfrm>
-            <a:off x="307910" y="1098847"/>
-            <a:ext cx="8599487" cy="1543034"/>
+            <a:off x="272255" y="1181692"/>
+            <a:ext cx="8599487" cy="5073389"/>
           </a:xfrm>
           <a:prstGeom prst="rect">
             <a:avLst/>
@@ -8114,345 +7865,305 @@
               </a:spcBef>
             </a:pPr>
             <a:r>
-              <a:rPr lang="en-US" altLang="it-IT" sz="2000" dirty="0">
-                <a:solidFill>
-                  <a:srgbClr val="000000"/>
-                </a:solidFill>
-                <a:latin typeface="Garamond" panose="02020404030301010803" pitchFamily="18" charset="0"/>
-              </a:rPr>
-              <a:t>Due to the </a:t>
-            </a:r>
-            <a:r>
-              <a:rPr lang="en-US" altLang="it-IT" sz="2000" b="1" dirty="0">
-                <a:solidFill>
-                  <a:srgbClr val="000000"/>
-                </a:solidFill>
-                <a:latin typeface="Garamond" panose="02020404030301010803" pitchFamily="18" charset="0"/>
-              </a:rPr>
-              <a:t>lack of </a:t>
-            </a:r>
-            <a:r>
-              <a:rPr lang="en-US" altLang="it-IT" sz="2000" dirty="0">
-                <a:solidFill>
-                  <a:srgbClr val="000000"/>
-                </a:solidFill>
-                <a:latin typeface="Garamond" panose="02020404030301010803" pitchFamily="18" charset="0"/>
-              </a:rPr>
-              <a:t>memory (RAM) and </a:t>
-            </a:r>
-            <a:r>
-              <a:rPr lang="en-US" altLang="it-IT" sz="2000" b="1" dirty="0">
-                <a:solidFill>
-                  <a:srgbClr val="000000"/>
-                </a:solidFill>
-                <a:latin typeface="Garamond" panose="02020404030301010803" pitchFamily="18" charset="0"/>
-              </a:rPr>
-              <a:t>computational power </a:t>
-            </a:r>
-            <a:r>
-              <a:rPr lang="en-US" altLang="it-IT" sz="2000" dirty="0">
-                <a:solidFill>
-                  <a:srgbClr val="000000"/>
-                </a:solidFill>
-                <a:latin typeface="Garamond" panose="02020404030301010803" pitchFamily="18" charset="0"/>
-              </a:rPr>
-              <a:t>given to us, as we were undergraduate students: </a:t>
-            </a:r>
-            <a:r>
-              <a:rPr lang="en-US" altLang="it-IT" sz="1800" dirty="0">
-                <a:solidFill>
-                  <a:srgbClr val="000000"/>
-                </a:solidFill>
-                <a:latin typeface="Garamond" panose="02020404030301010803" pitchFamily="18" charset="0"/>
-              </a:rPr>
-              <a:t>Instead of converting each MRI in 100 pictures, we have extracted only 8 pictures for each MRI, Trained on 3 folds instead of 20, haven’t performed any data augmentation. </a:t>
-            </a:r>
-            <a:r>
-              <a:rPr lang="en-US" altLang="it-IT" sz="2000" dirty="0">
-                <a:solidFill>
-                  <a:srgbClr val="000000"/>
-                </a:solidFill>
-                <a:latin typeface="Garamond" panose="02020404030301010803" pitchFamily="18" charset="0"/>
-              </a:rPr>
-              <a:t>However, </a:t>
-            </a:r>
-            <a:r>
-              <a:rPr lang="en-US" altLang="it-IT" sz="2000" b="1" dirty="0">
-                <a:solidFill>
-                  <a:srgbClr val="000000"/>
-                </a:solidFill>
-                <a:latin typeface="Garamond" panose="02020404030301010803" pitchFamily="18" charset="0"/>
-              </a:rPr>
-              <a:t>our supervisor will execute more exhaustive tests</a:t>
-            </a:r>
-            <a:r>
-              <a:rPr lang="en-US" altLang="it-IT" sz="2000" dirty="0">
-                <a:solidFill>
-                  <a:srgbClr val="000000"/>
-                </a:solidFill>
-                <a:latin typeface="Garamond" panose="02020404030301010803" pitchFamily="18" charset="0"/>
-              </a:rPr>
-              <a:t>.</a:t>
-            </a:r>
-          </a:p>
-          <a:p>
-            <a:pPr eaLnBrk="1" hangingPunct="1">
-              <a:spcBef>
-                <a:spcPct val="20000"/>
-              </a:spcBef>
-            </a:pPr>
-            <a:r>
-              <a:rPr lang="en-US" altLang="it-IT" sz="1800" b="1" dirty="0">
-                <a:solidFill>
-                  <a:srgbClr val="000000"/>
-                </a:solidFill>
-                <a:latin typeface="Garamond" panose="02020404030301010803" pitchFamily="18" charset="0"/>
-              </a:rPr>
-              <a:t>CN vs AD:</a:t>
-            </a:r>
-          </a:p>
-          <a:p>
-            <a:pPr eaLnBrk="1" hangingPunct="1">
-              <a:spcBef>
-                <a:spcPct val="20000"/>
-              </a:spcBef>
-            </a:pPr>
-            <a:endParaRPr lang="en-US" altLang="it-IT" sz="2200" dirty="0">
+              <a:rPr lang="en-US" altLang="it-IT" sz="2200" dirty="0">
+                <a:solidFill>
+                  <a:srgbClr val="000000"/>
+                </a:solidFill>
+                <a:latin typeface="Garamond" panose="02020404030301010803" pitchFamily="18" charset="0"/>
+              </a:rPr>
+              <a:t>A key challenge in applying CNNs is that sufficient training data are not always available in medical images. To avoid Over/Under-fitting:</a:t>
+            </a:r>
+            <a:endParaRPr lang="en-US" altLang="it-IT" sz="2200" b="1" dirty="0">
               <a:solidFill>
                 <a:srgbClr val="000000"/>
               </a:solidFill>
               <a:latin typeface="Garamond" panose="02020404030301010803" pitchFamily="18" charset="0"/>
             </a:endParaRPr>
           </a:p>
-        </p:txBody>
-      </p:sp>
-      <p:pic>
-        <p:nvPicPr>
-          <p:cNvPr id="2" name="Immagine 1">
-            <a:extLst>
-              <a:ext uri="{FF2B5EF4-FFF2-40B4-BE49-F238E27FC236}">
-                <a16:creationId xmlns:a16="http://schemas.microsoft.com/office/drawing/2014/main" id="{500A64CD-33B7-45DF-B621-7AD41292CB6D}"/>
-              </a:ext>
-            </a:extLst>
-          </p:cNvPr>
-          <p:cNvPicPr>
-            <a:picLocks noChangeAspect="1"/>
-          </p:cNvPicPr>
-          <p:nvPr/>
-        </p:nvPicPr>
-        <p:blipFill>
-          <a:blip r:embed="rId2"/>
-          <a:stretch>
-            <a:fillRect/>
-          </a:stretch>
-        </p:blipFill>
-        <p:spPr>
-          <a:xfrm>
-            <a:off x="1755354" y="2396319"/>
-            <a:ext cx="7152044" cy="1145078"/>
-          </a:xfrm>
-          <a:prstGeom prst="rect">
-            <a:avLst/>
-          </a:prstGeom>
-        </p:spPr>
-      </p:pic>
-      <p:sp>
-        <p:nvSpPr>
-          <p:cNvPr id="3" name="Rettangolo 2">
-            <a:extLst>
-              <a:ext uri="{FF2B5EF4-FFF2-40B4-BE49-F238E27FC236}">
-                <a16:creationId xmlns:a16="http://schemas.microsoft.com/office/drawing/2014/main" id="{D73C3386-E891-48BB-AEB0-70BDADFC5C3E}"/>
-              </a:ext>
-            </a:extLst>
-          </p:cNvPr>
-          <p:cNvSpPr/>
-          <p:nvPr/>
-        </p:nvSpPr>
-        <p:spPr>
-          <a:xfrm>
-            <a:off x="272255" y="3614865"/>
-            <a:ext cx="1483098" cy="369332"/>
-          </a:xfrm>
-          <a:prstGeom prst="rect">
-            <a:avLst/>
-          </a:prstGeom>
-        </p:spPr>
-        <p:txBody>
-          <a:bodyPr wrap="none">
-            <a:spAutoFit/>
-          </a:bodyPr>
-          <a:lstStyle/>
-          <a:p>
-            <a:pPr eaLnBrk="1" hangingPunct="1">
+          <a:p>
+            <a:pPr marL="342900" indent="-342900" eaLnBrk="1" hangingPunct="1">
               <a:spcBef>
                 <a:spcPct val="20000"/>
               </a:spcBef>
+              <a:buFont typeface="Arial" panose="020B0604020202020204" pitchFamily="34" charset="0"/>
+              <a:buChar char="•"/>
             </a:pPr>
             <a:r>
-              <a:rPr lang="en-US" altLang="it-IT" b="1" dirty="0">
-                <a:solidFill>
-                  <a:srgbClr val="000000"/>
-                </a:solidFill>
-                <a:latin typeface="Garamond" panose="02020404030301010803" pitchFamily="18" charset="0"/>
-              </a:rPr>
-              <a:t>CN vs </a:t>
-            </a:r>
-            <a:r>
-              <a:rPr lang="en-US" altLang="it-IT" b="1" dirty="0" err="1">
-                <a:solidFill>
-                  <a:srgbClr val="000000"/>
-                </a:solidFill>
-                <a:latin typeface="Garamond" panose="02020404030301010803" pitchFamily="18" charset="0"/>
-              </a:rPr>
-              <a:t>MCIc</a:t>
-            </a:r>
-            <a:r>
-              <a:rPr lang="en-US" altLang="it-IT" b="1" dirty="0">
-                <a:solidFill>
-                  <a:srgbClr val="000000"/>
-                </a:solidFill>
-                <a:latin typeface="Garamond" panose="02020404030301010803" pitchFamily="18" charset="0"/>
-              </a:rPr>
-              <a:t>:</a:t>
-            </a:r>
-          </a:p>
-        </p:txBody>
-      </p:sp>
-      <p:pic>
-        <p:nvPicPr>
-          <p:cNvPr id="4" name="Immagine 3">
-            <a:extLst>
-              <a:ext uri="{FF2B5EF4-FFF2-40B4-BE49-F238E27FC236}">
-                <a16:creationId xmlns:a16="http://schemas.microsoft.com/office/drawing/2014/main" id="{3DF83764-8E2C-4622-A41A-23C39E378CE5}"/>
-              </a:ext>
-            </a:extLst>
-          </p:cNvPr>
-          <p:cNvPicPr>
-            <a:picLocks noChangeAspect="1"/>
-          </p:cNvPicPr>
-          <p:nvPr/>
-        </p:nvPicPr>
-        <p:blipFill>
-          <a:blip r:embed="rId3"/>
-          <a:stretch>
-            <a:fillRect/>
-          </a:stretch>
-        </p:blipFill>
-        <p:spPr>
-          <a:xfrm>
-            <a:off x="1755353" y="3701886"/>
-            <a:ext cx="7152044" cy="1163850"/>
-          </a:xfrm>
-          <a:prstGeom prst="rect">
-            <a:avLst/>
-          </a:prstGeom>
-        </p:spPr>
-      </p:pic>
-      <p:sp>
-        <p:nvSpPr>
-          <p:cNvPr id="10" name="Rettangolo 9">
-            <a:extLst>
-              <a:ext uri="{FF2B5EF4-FFF2-40B4-BE49-F238E27FC236}">
-                <a16:creationId xmlns:a16="http://schemas.microsoft.com/office/drawing/2014/main" id="{B2D9FFBC-3F82-40F4-B00D-831C3B019773}"/>
-              </a:ext>
-            </a:extLst>
-          </p:cNvPr>
-          <p:cNvSpPr/>
-          <p:nvPr/>
-        </p:nvSpPr>
-        <p:spPr>
-          <a:xfrm>
-            <a:off x="236603" y="4865736"/>
-            <a:ext cx="1827744" cy="369332"/>
-          </a:xfrm>
-          <a:prstGeom prst="rect">
-            <a:avLst/>
-          </a:prstGeom>
-        </p:spPr>
-        <p:txBody>
-          <a:bodyPr wrap="none">
-            <a:spAutoFit/>
-          </a:bodyPr>
-          <a:lstStyle/>
-          <a:p>
-            <a:pPr eaLnBrk="1" hangingPunct="1">
+              <a:rPr lang="en-US" altLang="it-IT" sz="2200" b="1" dirty="0">
+                <a:solidFill>
+                  <a:srgbClr val="000000"/>
+                </a:solidFill>
+                <a:latin typeface="Garamond" panose="02020404030301010803" pitchFamily="18" charset="0"/>
+              </a:rPr>
+              <a:t>Data Augmentation: </a:t>
+            </a:r>
+            <a:r>
+              <a:rPr lang="en-US" altLang="it-IT" sz="2200" dirty="0">
+                <a:solidFill>
+                  <a:srgbClr val="000000"/>
+                </a:solidFill>
+                <a:latin typeface="Garamond" panose="02020404030301010803" pitchFamily="18" charset="0"/>
+              </a:rPr>
+              <a:t>In case of medical images this often comes down to </a:t>
+            </a:r>
+            <a:r>
+              <a:rPr lang="en-US" altLang="it-IT" sz="2200" b="1" dirty="0">
+                <a:solidFill>
+                  <a:srgbClr val="000000"/>
+                </a:solidFill>
+                <a:latin typeface="Garamond" panose="02020404030301010803" pitchFamily="18" charset="0"/>
+              </a:rPr>
+              <a:t>mirror flipping</a:t>
+            </a:r>
+            <a:r>
+              <a:rPr lang="en-US" altLang="it-IT" sz="2200" dirty="0">
+                <a:solidFill>
+                  <a:srgbClr val="000000"/>
+                </a:solidFill>
+                <a:latin typeface="Garamond" panose="02020404030301010803" pitchFamily="18" charset="0"/>
+              </a:rPr>
+              <a:t>, small-magnitude translations, weak Gaussian blurring, </a:t>
+            </a:r>
+            <a:r>
+              <a:rPr lang="en-US" altLang="it-IT" sz="2200" b="1" dirty="0">
+                <a:solidFill>
+                  <a:srgbClr val="000000"/>
+                </a:solidFill>
+                <a:latin typeface="Garamond" panose="02020404030301010803" pitchFamily="18" charset="0"/>
+              </a:rPr>
+              <a:t>brightness augmentation </a:t>
+            </a:r>
+            <a:r>
+              <a:rPr lang="en-US" altLang="it-IT" sz="2200" dirty="0">
+                <a:solidFill>
+                  <a:srgbClr val="000000"/>
+                </a:solidFill>
+                <a:latin typeface="Garamond" panose="02020404030301010803" pitchFamily="18" charset="0"/>
+              </a:rPr>
+              <a:t>and </a:t>
+            </a:r>
+            <a:r>
+              <a:rPr lang="en-US" altLang="it-IT" sz="2200" b="1" dirty="0">
+                <a:solidFill>
+                  <a:srgbClr val="000000"/>
+                </a:solidFill>
+                <a:latin typeface="Garamond" panose="02020404030301010803" pitchFamily="18" charset="0"/>
+              </a:rPr>
+              <a:t>shadow augmentation</a:t>
+            </a:r>
+            <a:r>
+              <a:rPr lang="en-US" altLang="it-IT" sz="2200" dirty="0">
+                <a:solidFill>
+                  <a:srgbClr val="000000"/>
+                </a:solidFill>
+                <a:latin typeface="Garamond" panose="02020404030301010803" pitchFamily="18" charset="0"/>
+              </a:rPr>
+              <a:t>.</a:t>
+            </a:r>
+          </a:p>
+          <a:p>
+            <a:pPr marL="342900" indent="-342900" eaLnBrk="1" hangingPunct="1">
               <a:spcBef>
                 <a:spcPct val="20000"/>
               </a:spcBef>
+              <a:buFont typeface="Arial" panose="020B0604020202020204" pitchFamily="34" charset="0"/>
+              <a:buChar char="•"/>
             </a:pPr>
             <a:r>
-              <a:rPr lang="en-US" altLang="it-IT" b="1" dirty="0" err="1">
-                <a:solidFill>
-                  <a:srgbClr val="000000"/>
-                </a:solidFill>
-                <a:latin typeface="Garamond" panose="02020404030301010803" pitchFamily="18" charset="0"/>
-              </a:rPr>
-              <a:t>MCInc</a:t>
-            </a:r>
-            <a:r>
-              <a:rPr lang="en-US" altLang="it-IT" b="1" dirty="0">
-                <a:solidFill>
-                  <a:srgbClr val="000000"/>
-                </a:solidFill>
-                <a:latin typeface="Garamond" panose="02020404030301010803" pitchFamily="18" charset="0"/>
-              </a:rPr>
-              <a:t> vs </a:t>
-            </a:r>
-            <a:r>
-              <a:rPr lang="en-US" altLang="it-IT" b="1" dirty="0" err="1">
-                <a:solidFill>
-                  <a:srgbClr val="000000"/>
-                </a:solidFill>
-                <a:latin typeface="Garamond" panose="02020404030301010803" pitchFamily="18" charset="0"/>
-              </a:rPr>
-              <a:t>MCIc</a:t>
-            </a:r>
-            <a:r>
-              <a:rPr lang="en-US" altLang="it-IT" b="1" dirty="0">
-                <a:solidFill>
-                  <a:srgbClr val="000000"/>
-                </a:solidFill>
-                <a:latin typeface="Garamond" panose="02020404030301010803" pitchFamily="18" charset="0"/>
-              </a:rPr>
-              <a:t>:</a:t>
-            </a:r>
-          </a:p>
-        </p:txBody>
-      </p:sp>
-      <p:pic>
-        <p:nvPicPr>
-          <p:cNvPr id="5" name="Immagine 4">
-            <a:extLst>
-              <a:ext uri="{FF2B5EF4-FFF2-40B4-BE49-F238E27FC236}">
-                <a16:creationId xmlns:a16="http://schemas.microsoft.com/office/drawing/2014/main" id="{60BD3C23-67FF-4D9B-BCCA-913A89A3E986}"/>
-              </a:ext>
-            </a:extLst>
-          </p:cNvPr>
-          <p:cNvPicPr>
-            <a:picLocks noChangeAspect="1"/>
-          </p:cNvPicPr>
-          <p:nvPr/>
-        </p:nvPicPr>
-        <p:blipFill>
-          <a:blip r:embed="rId4"/>
-          <a:stretch>
-            <a:fillRect/>
-          </a:stretch>
-        </p:blipFill>
-        <p:spPr>
-          <a:xfrm>
-            <a:off x="1755353" y="5219083"/>
-            <a:ext cx="7161424" cy="1163849"/>
-          </a:xfrm>
-          <a:prstGeom prst="rect">
-            <a:avLst/>
-          </a:prstGeom>
-        </p:spPr>
-      </p:pic>
+              <a:rPr lang="en-US" altLang="it-IT" sz="2200" b="1" dirty="0" err="1">
+                <a:solidFill>
+                  <a:srgbClr val="000000"/>
+                </a:solidFill>
+                <a:latin typeface="Garamond" panose="02020404030301010803" pitchFamily="18" charset="0"/>
+              </a:rPr>
+              <a:t>TransferLearning</a:t>
+            </a:r>
+            <a:r>
+              <a:rPr lang="en-US" altLang="it-IT" sz="2200" b="1" dirty="0">
+                <a:solidFill>
+                  <a:srgbClr val="000000"/>
+                </a:solidFill>
+                <a:latin typeface="Garamond" panose="02020404030301010803" pitchFamily="18" charset="0"/>
+              </a:rPr>
+              <a:t> from </a:t>
+            </a:r>
+            <a:r>
+              <a:rPr lang="en-US" altLang="it-IT" sz="2200" b="1" dirty="0" err="1">
+                <a:solidFill>
+                  <a:srgbClr val="000000"/>
+                </a:solidFill>
+                <a:latin typeface="Garamond" panose="02020404030301010803" pitchFamily="18" charset="0"/>
+              </a:rPr>
+              <a:t>AlexNet</a:t>
+            </a:r>
+            <a:r>
+              <a:rPr lang="en-US" altLang="it-IT" sz="2200" b="1" dirty="0">
+                <a:solidFill>
+                  <a:srgbClr val="000000"/>
+                </a:solidFill>
+                <a:latin typeface="Garamond" panose="02020404030301010803" pitchFamily="18" charset="0"/>
+              </a:rPr>
+              <a:t>: training</a:t>
+            </a:r>
+            <a:r>
+              <a:rPr lang="en-US" altLang="it-IT" sz="2200" dirty="0">
+                <a:solidFill>
+                  <a:srgbClr val="000000"/>
+                </a:solidFill>
+                <a:latin typeface="Garamond" panose="02020404030301010803" pitchFamily="18" charset="0"/>
+              </a:rPr>
+              <a:t> CNN </a:t>
+            </a:r>
+            <a:r>
+              <a:rPr lang="en-US" altLang="it-IT" sz="2200" b="1" dirty="0">
+                <a:solidFill>
+                  <a:srgbClr val="000000"/>
+                </a:solidFill>
+                <a:latin typeface="Garamond" panose="02020404030301010803" pitchFamily="18" charset="0"/>
+              </a:rPr>
+              <a:t>from scratch </a:t>
+            </a:r>
+            <a:r>
+              <a:rPr lang="en-US" altLang="it-IT" sz="2200" dirty="0">
+                <a:solidFill>
+                  <a:srgbClr val="000000"/>
+                </a:solidFill>
+                <a:latin typeface="Garamond" panose="02020404030301010803" pitchFamily="18" charset="0"/>
+              </a:rPr>
+              <a:t>is usually challenging owing to the limited amount of labeled medical data. A promising alternative is to fine-tune the weights of a network that was trained using a large set of labeled natural images.</a:t>
+            </a:r>
+          </a:p>
+          <a:p>
+            <a:pPr marL="1085850" lvl="1" indent="-342900" eaLnBrk="1" hangingPunct="1">
+              <a:spcBef>
+                <a:spcPct val="20000"/>
+              </a:spcBef>
+              <a:buFont typeface="Courier New" panose="02070309020205020404" pitchFamily="49" charset="0"/>
+              <a:buChar char="o"/>
+            </a:pPr>
+            <a:r>
+              <a:rPr lang="en-US" altLang="it-IT" sz="2000" dirty="0">
+                <a:solidFill>
+                  <a:srgbClr val="000000"/>
+                </a:solidFill>
+                <a:latin typeface="Garamond" panose="02020404030301010803" pitchFamily="18" charset="0"/>
+              </a:rPr>
+              <a:t>Prof. </a:t>
+            </a:r>
+            <a:r>
+              <a:rPr lang="en-US" altLang="it-IT" sz="2000" dirty="0" err="1">
+                <a:solidFill>
+                  <a:srgbClr val="000000"/>
+                </a:solidFill>
+                <a:latin typeface="Garamond" panose="02020404030301010803" pitchFamily="18" charset="0"/>
+              </a:rPr>
+              <a:t>Tajbakhsh</a:t>
+            </a:r>
+            <a:r>
+              <a:rPr lang="en-US" altLang="it-IT" sz="2000" dirty="0">
+                <a:solidFill>
+                  <a:srgbClr val="000000"/>
+                </a:solidFill>
+                <a:latin typeface="Garamond" panose="02020404030301010803" pitchFamily="18" charset="0"/>
+              </a:rPr>
+              <a:t>, Illinois Institute of Technology: considered several medical imaging applications and investigated how the performance of </a:t>
+            </a:r>
+            <a:r>
+              <a:rPr lang="en-US" altLang="it-IT" sz="2000" b="1" dirty="0">
+                <a:solidFill>
+                  <a:srgbClr val="000000"/>
+                </a:solidFill>
+                <a:latin typeface="Garamond" panose="02020404030301010803" pitchFamily="18" charset="0"/>
+              </a:rPr>
+              <a:t>CNNs</a:t>
+            </a:r>
+            <a:r>
+              <a:rPr lang="en-US" altLang="it-IT" sz="2000" dirty="0">
+                <a:solidFill>
+                  <a:srgbClr val="000000"/>
+                </a:solidFill>
+                <a:latin typeface="Garamond" panose="02020404030301010803" pitchFamily="18" charset="0"/>
+              </a:rPr>
+              <a:t> trained </a:t>
+            </a:r>
+            <a:r>
+              <a:rPr lang="en-US" altLang="it-IT" sz="2000" b="1" dirty="0">
+                <a:solidFill>
+                  <a:srgbClr val="000000"/>
+                </a:solidFill>
+                <a:latin typeface="Garamond" panose="02020404030301010803" pitchFamily="18" charset="0"/>
+              </a:rPr>
+              <a:t>from scratch compared</a:t>
+            </a:r>
+            <a:r>
+              <a:rPr lang="en-US" altLang="it-IT" sz="2000" dirty="0">
+                <a:solidFill>
+                  <a:srgbClr val="000000"/>
+                </a:solidFill>
+                <a:latin typeface="Garamond" panose="02020404030301010803" pitchFamily="18" charset="0"/>
+              </a:rPr>
+              <a:t> with the </a:t>
+            </a:r>
+            <a:r>
+              <a:rPr lang="en-US" altLang="it-IT" sz="2000" b="1" dirty="0">
+                <a:solidFill>
+                  <a:srgbClr val="000000"/>
+                </a:solidFill>
+                <a:latin typeface="Garamond" panose="02020404030301010803" pitchFamily="18" charset="0"/>
+              </a:rPr>
+              <a:t>pre-trained</a:t>
+            </a:r>
+            <a:r>
+              <a:rPr lang="en-US" altLang="it-IT" sz="2000" dirty="0">
+                <a:solidFill>
+                  <a:srgbClr val="000000"/>
+                </a:solidFill>
+                <a:latin typeface="Garamond" panose="02020404030301010803" pitchFamily="18" charset="0"/>
+              </a:rPr>
+              <a:t> CNNs.</a:t>
+            </a:r>
+            <a:br>
+              <a:rPr lang="en-US" altLang="it-IT" sz="2000" dirty="0">
+                <a:solidFill>
+                  <a:srgbClr val="000000"/>
+                </a:solidFill>
+                <a:latin typeface="Garamond" panose="02020404030301010803" pitchFamily="18" charset="0"/>
+              </a:rPr>
+            </a:br>
+            <a:r>
+              <a:rPr lang="en-US" altLang="it-IT" sz="2000" dirty="0">
+                <a:solidFill>
+                  <a:srgbClr val="000000"/>
+                </a:solidFill>
+                <a:latin typeface="Garamond" panose="02020404030301010803" pitchFamily="18" charset="0"/>
+              </a:rPr>
+              <a:t>Their experiments demonstrated that pretrained </a:t>
+            </a:r>
+            <a:r>
+              <a:rPr lang="en-US" altLang="it-IT" sz="2000" b="1" dirty="0">
+                <a:solidFill>
+                  <a:srgbClr val="000000"/>
+                </a:solidFill>
+                <a:latin typeface="Garamond" panose="02020404030301010803" pitchFamily="18" charset="0"/>
+              </a:rPr>
+              <a:t>CNNs performed better </a:t>
+            </a:r>
+            <a:r>
+              <a:rPr lang="en-US" altLang="it-IT" sz="2000" dirty="0">
+                <a:solidFill>
+                  <a:srgbClr val="000000"/>
+                </a:solidFill>
+                <a:latin typeface="Garamond" panose="02020404030301010803" pitchFamily="18" charset="0"/>
+              </a:rPr>
+              <a:t>than CNN trained from scratch.</a:t>
+            </a:r>
+          </a:p>
+        </p:txBody>
+      </p:sp>
     </p:spTree>
     <p:extLst>
       <p:ext uri="{BB962C8B-B14F-4D97-AF65-F5344CB8AC3E}">
-        <p14:creationId xmlns:p14="http://schemas.microsoft.com/office/powerpoint/2010/main" val="597525046"/>
+        <p14:creationId xmlns:p14="http://schemas.microsoft.com/office/powerpoint/2010/main" val="2097444773"/>
       </p:ext>
     </p:extLst>
   </p:cSld>
@@ -8636,20 +8347,14 @@
           </a:lstStyle>
           <a:p>
             <a:r>
-              <a:rPr lang="en-US" altLang="it-IT" sz="6000">
+              <a:rPr lang="en-US" altLang="it-IT" sz="6000" dirty="0">
                 <a:solidFill>
                   <a:srgbClr val="FFFFFF"/>
                 </a:solidFill>
                 <a:latin typeface="Tw Cen MT" panose="020B0602020104020603" pitchFamily="34" charset="0"/>
               </a:rPr>
-              <a:t>Conclusions</a:t>
-            </a:r>
-            <a:endParaRPr lang="en-US" altLang="it-IT" sz="6000" dirty="0">
-              <a:solidFill>
-                <a:srgbClr val="FFFFFF"/>
-              </a:solidFill>
-              <a:latin typeface="Tw Cen MT" panose="020B0602020104020603" pitchFamily="34" charset="0"/>
-            </a:endParaRPr>
+              <a:t>Performances</a:t>
+            </a:r>
           </a:p>
         </p:txBody>
       </p:sp>
@@ -8711,7 +8416,7 @@
         </p:nvSpPr>
         <p:spPr>
           <a:xfrm>
-            <a:off x="8670794" y="6413034"/>
+            <a:off x="8670794" y="6397833"/>
             <a:ext cx="473206" cy="461665"/>
           </a:xfrm>
           <a:prstGeom prst="rect">
@@ -8736,7 +8441,7 @@
                 </a:solidFill>
                 <a:latin typeface="Garamond" panose="02020404030301010803" pitchFamily="18" charset="0"/>
               </a:rPr>
-              <a:t>11</a:t>
+              <a:t>10</a:t>
             </a:r>
           </a:p>
         </p:txBody>
@@ -8801,8 +8506,8 @@
         </p:nvSpPr>
         <p:spPr bwMode="auto">
           <a:xfrm>
-            <a:off x="272255" y="1181692"/>
-            <a:ext cx="8599487" cy="5073389"/>
+            <a:off x="307910" y="1098847"/>
+            <a:ext cx="8599487" cy="1543034"/>
           </a:xfrm>
           <a:prstGeom prst="rect">
             <a:avLst/>
@@ -8940,6 +8645,832 @@
               </a:spcBef>
             </a:pPr>
             <a:r>
+              <a:rPr lang="en-US" altLang="it-IT" sz="2000" dirty="0">
+                <a:solidFill>
+                  <a:srgbClr val="000000"/>
+                </a:solidFill>
+                <a:latin typeface="Garamond" panose="02020404030301010803" pitchFamily="18" charset="0"/>
+              </a:rPr>
+              <a:t>Due to the </a:t>
+            </a:r>
+            <a:r>
+              <a:rPr lang="en-US" altLang="it-IT" sz="2000" b="1" dirty="0">
+                <a:solidFill>
+                  <a:srgbClr val="000000"/>
+                </a:solidFill>
+                <a:latin typeface="Garamond" panose="02020404030301010803" pitchFamily="18" charset="0"/>
+              </a:rPr>
+              <a:t>lack of </a:t>
+            </a:r>
+            <a:r>
+              <a:rPr lang="en-US" altLang="it-IT" sz="2000" dirty="0">
+                <a:solidFill>
+                  <a:srgbClr val="000000"/>
+                </a:solidFill>
+                <a:latin typeface="Garamond" panose="02020404030301010803" pitchFamily="18" charset="0"/>
+              </a:rPr>
+              <a:t>memory (RAM) and </a:t>
+            </a:r>
+            <a:r>
+              <a:rPr lang="en-US" altLang="it-IT" sz="2000" b="1" dirty="0">
+                <a:solidFill>
+                  <a:srgbClr val="000000"/>
+                </a:solidFill>
+                <a:latin typeface="Garamond" panose="02020404030301010803" pitchFamily="18" charset="0"/>
+              </a:rPr>
+              <a:t>computational power </a:t>
+            </a:r>
+            <a:r>
+              <a:rPr lang="en-US" altLang="it-IT" sz="2000" dirty="0">
+                <a:solidFill>
+                  <a:srgbClr val="000000"/>
+                </a:solidFill>
+                <a:latin typeface="Garamond" panose="02020404030301010803" pitchFamily="18" charset="0"/>
+              </a:rPr>
+              <a:t>given to us, as we were undergraduate students: </a:t>
+            </a:r>
+            <a:r>
+              <a:rPr lang="en-US" altLang="it-IT" sz="1800" dirty="0">
+                <a:solidFill>
+                  <a:srgbClr val="000000"/>
+                </a:solidFill>
+                <a:latin typeface="Garamond" panose="02020404030301010803" pitchFamily="18" charset="0"/>
+              </a:rPr>
+              <a:t>Instead of converting each MRI in 100 pictures, we have extracted only 8 pictures for each MRI, Trained on 3 folds instead of 20, haven’t performed any data augmentation. </a:t>
+            </a:r>
+            <a:r>
+              <a:rPr lang="en-US" altLang="it-IT" sz="2000" dirty="0">
+                <a:solidFill>
+                  <a:srgbClr val="000000"/>
+                </a:solidFill>
+                <a:latin typeface="Garamond" panose="02020404030301010803" pitchFamily="18" charset="0"/>
+              </a:rPr>
+              <a:t>However, </a:t>
+            </a:r>
+            <a:r>
+              <a:rPr lang="en-US" altLang="it-IT" sz="2000" b="1" dirty="0">
+                <a:solidFill>
+                  <a:srgbClr val="000000"/>
+                </a:solidFill>
+                <a:latin typeface="Garamond" panose="02020404030301010803" pitchFamily="18" charset="0"/>
+              </a:rPr>
+              <a:t>our supervisor will execute more exhaustive tests</a:t>
+            </a:r>
+            <a:r>
+              <a:rPr lang="en-US" altLang="it-IT" sz="2000" dirty="0">
+                <a:solidFill>
+                  <a:srgbClr val="000000"/>
+                </a:solidFill>
+                <a:latin typeface="Garamond" panose="02020404030301010803" pitchFamily="18" charset="0"/>
+              </a:rPr>
+              <a:t>.</a:t>
+            </a:r>
+          </a:p>
+          <a:p>
+            <a:pPr eaLnBrk="1" hangingPunct="1">
+              <a:spcBef>
+                <a:spcPct val="20000"/>
+              </a:spcBef>
+            </a:pPr>
+            <a:r>
+              <a:rPr lang="en-US" altLang="it-IT" sz="1800" b="1" dirty="0">
+                <a:solidFill>
+                  <a:srgbClr val="000000"/>
+                </a:solidFill>
+                <a:latin typeface="Garamond" panose="02020404030301010803" pitchFamily="18" charset="0"/>
+              </a:rPr>
+              <a:t>CN vs AD:</a:t>
+            </a:r>
+          </a:p>
+          <a:p>
+            <a:pPr eaLnBrk="1" hangingPunct="1">
+              <a:spcBef>
+                <a:spcPct val="20000"/>
+              </a:spcBef>
+            </a:pPr>
+            <a:endParaRPr lang="en-US" altLang="it-IT" sz="2200" dirty="0">
+              <a:solidFill>
+                <a:srgbClr val="000000"/>
+              </a:solidFill>
+              <a:latin typeface="Garamond" panose="02020404030301010803" pitchFamily="18" charset="0"/>
+            </a:endParaRPr>
+          </a:p>
+        </p:txBody>
+      </p:sp>
+      <p:pic>
+        <p:nvPicPr>
+          <p:cNvPr id="2" name="Immagine 1">
+            <a:extLst>
+              <a:ext uri="{FF2B5EF4-FFF2-40B4-BE49-F238E27FC236}">
+                <a16:creationId xmlns:a16="http://schemas.microsoft.com/office/drawing/2014/main" id="{500A64CD-33B7-45DF-B621-7AD41292CB6D}"/>
+              </a:ext>
+            </a:extLst>
+          </p:cNvPr>
+          <p:cNvPicPr>
+            <a:picLocks noChangeAspect="1"/>
+          </p:cNvPicPr>
+          <p:nvPr/>
+        </p:nvPicPr>
+        <p:blipFill>
+          <a:blip r:embed="rId2"/>
+          <a:stretch>
+            <a:fillRect/>
+          </a:stretch>
+        </p:blipFill>
+        <p:spPr>
+          <a:xfrm>
+            <a:off x="1755354" y="2396319"/>
+            <a:ext cx="7152044" cy="1145078"/>
+          </a:xfrm>
+          <a:prstGeom prst="rect">
+            <a:avLst/>
+          </a:prstGeom>
+        </p:spPr>
+      </p:pic>
+      <p:sp>
+        <p:nvSpPr>
+          <p:cNvPr id="3" name="Rettangolo 2">
+            <a:extLst>
+              <a:ext uri="{FF2B5EF4-FFF2-40B4-BE49-F238E27FC236}">
+                <a16:creationId xmlns:a16="http://schemas.microsoft.com/office/drawing/2014/main" id="{D73C3386-E891-48BB-AEB0-70BDADFC5C3E}"/>
+              </a:ext>
+            </a:extLst>
+          </p:cNvPr>
+          <p:cNvSpPr/>
+          <p:nvPr/>
+        </p:nvSpPr>
+        <p:spPr>
+          <a:xfrm>
+            <a:off x="272255" y="3614865"/>
+            <a:ext cx="1483098" cy="369332"/>
+          </a:xfrm>
+          <a:prstGeom prst="rect">
+            <a:avLst/>
+          </a:prstGeom>
+        </p:spPr>
+        <p:txBody>
+          <a:bodyPr wrap="none">
+            <a:spAutoFit/>
+          </a:bodyPr>
+          <a:lstStyle/>
+          <a:p>
+            <a:pPr eaLnBrk="1" hangingPunct="1">
+              <a:spcBef>
+                <a:spcPct val="20000"/>
+              </a:spcBef>
+            </a:pPr>
+            <a:r>
+              <a:rPr lang="en-US" altLang="it-IT" b="1" dirty="0">
+                <a:solidFill>
+                  <a:srgbClr val="000000"/>
+                </a:solidFill>
+                <a:latin typeface="Garamond" panose="02020404030301010803" pitchFamily="18" charset="0"/>
+              </a:rPr>
+              <a:t>CN vs </a:t>
+            </a:r>
+            <a:r>
+              <a:rPr lang="en-US" altLang="it-IT" b="1" dirty="0" err="1">
+                <a:solidFill>
+                  <a:srgbClr val="000000"/>
+                </a:solidFill>
+                <a:latin typeface="Garamond" panose="02020404030301010803" pitchFamily="18" charset="0"/>
+              </a:rPr>
+              <a:t>MCIc</a:t>
+            </a:r>
+            <a:r>
+              <a:rPr lang="en-US" altLang="it-IT" b="1" dirty="0">
+                <a:solidFill>
+                  <a:srgbClr val="000000"/>
+                </a:solidFill>
+                <a:latin typeface="Garamond" panose="02020404030301010803" pitchFamily="18" charset="0"/>
+              </a:rPr>
+              <a:t>:</a:t>
+            </a:r>
+          </a:p>
+        </p:txBody>
+      </p:sp>
+      <p:pic>
+        <p:nvPicPr>
+          <p:cNvPr id="4" name="Immagine 3">
+            <a:extLst>
+              <a:ext uri="{FF2B5EF4-FFF2-40B4-BE49-F238E27FC236}">
+                <a16:creationId xmlns:a16="http://schemas.microsoft.com/office/drawing/2014/main" id="{3DF83764-8E2C-4622-A41A-23C39E378CE5}"/>
+              </a:ext>
+            </a:extLst>
+          </p:cNvPr>
+          <p:cNvPicPr>
+            <a:picLocks noChangeAspect="1"/>
+          </p:cNvPicPr>
+          <p:nvPr/>
+        </p:nvPicPr>
+        <p:blipFill>
+          <a:blip r:embed="rId3"/>
+          <a:stretch>
+            <a:fillRect/>
+          </a:stretch>
+        </p:blipFill>
+        <p:spPr>
+          <a:xfrm>
+            <a:off x="1755353" y="3701886"/>
+            <a:ext cx="7152044" cy="1163850"/>
+          </a:xfrm>
+          <a:prstGeom prst="rect">
+            <a:avLst/>
+          </a:prstGeom>
+        </p:spPr>
+      </p:pic>
+      <p:sp>
+        <p:nvSpPr>
+          <p:cNvPr id="10" name="Rettangolo 9">
+            <a:extLst>
+              <a:ext uri="{FF2B5EF4-FFF2-40B4-BE49-F238E27FC236}">
+                <a16:creationId xmlns:a16="http://schemas.microsoft.com/office/drawing/2014/main" id="{B2D9FFBC-3F82-40F4-B00D-831C3B019773}"/>
+              </a:ext>
+            </a:extLst>
+          </p:cNvPr>
+          <p:cNvSpPr/>
+          <p:nvPr/>
+        </p:nvSpPr>
+        <p:spPr>
+          <a:xfrm>
+            <a:off x="236603" y="4865736"/>
+            <a:ext cx="1827744" cy="369332"/>
+          </a:xfrm>
+          <a:prstGeom prst="rect">
+            <a:avLst/>
+          </a:prstGeom>
+        </p:spPr>
+        <p:txBody>
+          <a:bodyPr wrap="none">
+            <a:spAutoFit/>
+          </a:bodyPr>
+          <a:lstStyle/>
+          <a:p>
+            <a:pPr eaLnBrk="1" hangingPunct="1">
+              <a:spcBef>
+                <a:spcPct val="20000"/>
+              </a:spcBef>
+            </a:pPr>
+            <a:r>
+              <a:rPr lang="en-US" altLang="it-IT" b="1" dirty="0" err="1">
+                <a:solidFill>
+                  <a:srgbClr val="000000"/>
+                </a:solidFill>
+                <a:latin typeface="Garamond" panose="02020404030301010803" pitchFamily="18" charset="0"/>
+              </a:rPr>
+              <a:t>MCInc</a:t>
+            </a:r>
+            <a:r>
+              <a:rPr lang="en-US" altLang="it-IT" b="1" dirty="0">
+                <a:solidFill>
+                  <a:srgbClr val="000000"/>
+                </a:solidFill>
+                <a:latin typeface="Garamond" panose="02020404030301010803" pitchFamily="18" charset="0"/>
+              </a:rPr>
+              <a:t> vs </a:t>
+            </a:r>
+            <a:r>
+              <a:rPr lang="en-US" altLang="it-IT" b="1" dirty="0" err="1">
+                <a:solidFill>
+                  <a:srgbClr val="000000"/>
+                </a:solidFill>
+                <a:latin typeface="Garamond" panose="02020404030301010803" pitchFamily="18" charset="0"/>
+              </a:rPr>
+              <a:t>MCIc</a:t>
+            </a:r>
+            <a:r>
+              <a:rPr lang="en-US" altLang="it-IT" b="1" dirty="0">
+                <a:solidFill>
+                  <a:srgbClr val="000000"/>
+                </a:solidFill>
+                <a:latin typeface="Garamond" panose="02020404030301010803" pitchFamily="18" charset="0"/>
+              </a:rPr>
+              <a:t>:</a:t>
+            </a:r>
+          </a:p>
+        </p:txBody>
+      </p:sp>
+      <p:pic>
+        <p:nvPicPr>
+          <p:cNvPr id="5" name="Immagine 4">
+            <a:extLst>
+              <a:ext uri="{FF2B5EF4-FFF2-40B4-BE49-F238E27FC236}">
+                <a16:creationId xmlns:a16="http://schemas.microsoft.com/office/drawing/2014/main" id="{60BD3C23-67FF-4D9B-BCCA-913A89A3E986}"/>
+              </a:ext>
+            </a:extLst>
+          </p:cNvPr>
+          <p:cNvPicPr>
+            <a:picLocks noChangeAspect="1"/>
+          </p:cNvPicPr>
+          <p:nvPr/>
+        </p:nvPicPr>
+        <p:blipFill>
+          <a:blip r:embed="rId4"/>
+          <a:stretch>
+            <a:fillRect/>
+          </a:stretch>
+        </p:blipFill>
+        <p:spPr>
+          <a:xfrm>
+            <a:off x="1755353" y="5219083"/>
+            <a:ext cx="7161424" cy="1163849"/>
+          </a:xfrm>
+          <a:prstGeom prst="rect">
+            <a:avLst/>
+          </a:prstGeom>
+        </p:spPr>
+      </p:pic>
+    </p:spTree>
+    <p:extLst>
+      <p:ext uri="{BB962C8B-B14F-4D97-AF65-F5344CB8AC3E}">
+        <p14:creationId xmlns:p14="http://schemas.microsoft.com/office/powerpoint/2010/main" val="597525046"/>
+      </p:ext>
+    </p:extLst>
+  </p:cSld>
+  <p:clrMapOvr>
+    <a:masterClrMapping/>
+  </p:clrMapOvr>
+</p:sld>
+</file>
+
+<file path=ppt/slides/slide14.xml><?xml version="1.0" encoding="utf-8"?>
+<p:sld xmlns:a="http://schemas.openxmlformats.org/drawingml/2006/main" xmlns:r="http://schemas.openxmlformats.org/officeDocument/2006/relationships" xmlns:p="http://schemas.openxmlformats.org/presentationml/2006/main">
+  <p:cSld>
+    <p:spTree>
+      <p:nvGrpSpPr>
+        <p:cNvPr id="1" name=""/>
+        <p:cNvGrpSpPr/>
+        <p:nvPr/>
+      </p:nvGrpSpPr>
+      <p:grpSpPr>
+        <a:xfrm>
+          <a:off x="0" y="0"/>
+          <a:ext cx="0" cy="0"/>
+          <a:chOff x="0" y="0"/>
+          <a:chExt cx="0" cy="0"/>
+        </a:xfrm>
+      </p:grpSpPr>
+      <p:sp>
+        <p:nvSpPr>
+          <p:cNvPr id="6" name="Title 1">
+            <a:extLst>
+              <a:ext uri="{FF2B5EF4-FFF2-40B4-BE49-F238E27FC236}">
+                <a16:creationId xmlns:a16="http://schemas.microsoft.com/office/drawing/2014/main" id="{B6FD3924-BD2E-47EB-8DCD-3AD635AE70B8}"/>
+              </a:ext>
+            </a:extLst>
+          </p:cNvPr>
+          <p:cNvSpPr txBox="1">
+            <a:spLocks/>
+          </p:cNvSpPr>
+          <p:nvPr/>
+        </p:nvSpPr>
+        <p:spPr bwMode="auto">
+          <a:xfrm>
+            <a:off x="15875" y="1"/>
+            <a:ext cx="8842375" cy="1016000"/>
+          </a:xfrm>
+          <a:prstGeom prst="rect">
+            <a:avLst/>
+          </a:prstGeom>
+          <a:noFill/>
+          <a:ln>
+            <a:noFill/>
+          </a:ln>
+          <a:extLst>
+            <a:ext uri="{909E8E84-426E-40DD-AFC4-6F175D3DCCD1}">
+              <a14:hiddenFill xmlns:a14="http://schemas.microsoft.com/office/drawing/2010/main">
+                <a:solidFill>
+                  <a:srgbClr val="FFFFFF"/>
+                </a:solidFill>
+              </a14:hiddenFill>
+            </a:ext>
+            <a:ext uri="{91240B29-F687-4F45-9708-019B960494DF}">
+              <a14:hiddenLine xmlns:a14="http://schemas.microsoft.com/office/drawing/2010/main" w="9525">
+                <a:solidFill>
+                  <a:srgbClr val="000000"/>
+                </a:solidFill>
+                <a:miter lim="800000"/>
+                <a:headEnd/>
+                <a:tailEnd/>
+              </a14:hiddenLine>
+            </a:ext>
+          </a:extLst>
+        </p:spPr>
+        <p:txBody>
+          <a:bodyPr/>
+          <a:lstStyle>
+            <a:lvl1pPr eaLnBrk="0" hangingPunct="0">
+              <a:defRPr sz="2400">
+                <a:solidFill>
+                  <a:schemeClr val="tx1"/>
+                </a:solidFill>
+                <a:latin typeface="Arial" panose="020B0604020202020204" pitchFamily="34" charset="0"/>
+                <a:ea typeface="MS PGothic" panose="020B0600070205080204" pitchFamily="34" charset="-128"/>
+              </a:defRPr>
+            </a:lvl1pPr>
+            <a:lvl2pPr marL="742950" indent="-285750" eaLnBrk="0" hangingPunct="0">
+              <a:defRPr sz="2400">
+                <a:solidFill>
+                  <a:schemeClr val="tx1"/>
+                </a:solidFill>
+                <a:latin typeface="Arial" panose="020B0604020202020204" pitchFamily="34" charset="0"/>
+                <a:ea typeface="MS PGothic" panose="020B0600070205080204" pitchFamily="34" charset="-128"/>
+              </a:defRPr>
+            </a:lvl2pPr>
+            <a:lvl3pPr marL="1143000" indent="-228600" eaLnBrk="0" hangingPunct="0">
+              <a:defRPr sz="2400">
+                <a:solidFill>
+                  <a:schemeClr val="tx1"/>
+                </a:solidFill>
+                <a:latin typeface="Arial" panose="020B0604020202020204" pitchFamily="34" charset="0"/>
+                <a:ea typeface="MS PGothic" panose="020B0600070205080204" pitchFamily="34" charset="-128"/>
+              </a:defRPr>
+            </a:lvl3pPr>
+            <a:lvl4pPr marL="1600200" indent="-228600" eaLnBrk="0" hangingPunct="0">
+              <a:defRPr sz="2400">
+                <a:solidFill>
+                  <a:schemeClr val="tx1"/>
+                </a:solidFill>
+                <a:latin typeface="Arial" panose="020B0604020202020204" pitchFamily="34" charset="0"/>
+                <a:ea typeface="MS PGothic" panose="020B0600070205080204" pitchFamily="34" charset="-128"/>
+              </a:defRPr>
+            </a:lvl4pPr>
+            <a:lvl5pPr marL="2057400" indent="-228600" eaLnBrk="0" hangingPunct="0">
+              <a:defRPr sz="2400">
+                <a:solidFill>
+                  <a:schemeClr val="tx1"/>
+                </a:solidFill>
+                <a:latin typeface="Arial" panose="020B0604020202020204" pitchFamily="34" charset="0"/>
+                <a:ea typeface="MS PGothic" panose="020B0600070205080204" pitchFamily="34" charset="-128"/>
+              </a:defRPr>
+            </a:lvl5pPr>
+            <a:lvl6pPr marL="2514600" indent="-228600" defTabSz="457200" eaLnBrk="0" fontAlgn="base" hangingPunct="0">
+              <a:spcBef>
+                <a:spcPct val="0"/>
+              </a:spcBef>
+              <a:spcAft>
+                <a:spcPct val="0"/>
+              </a:spcAft>
+              <a:defRPr sz="2400">
+                <a:solidFill>
+                  <a:schemeClr val="tx1"/>
+                </a:solidFill>
+                <a:latin typeface="Arial" panose="020B0604020202020204" pitchFamily="34" charset="0"/>
+                <a:ea typeface="MS PGothic" panose="020B0600070205080204" pitchFamily="34" charset="-128"/>
+              </a:defRPr>
+            </a:lvl6pPr>
+            <a:lvl7pPr marL="2971800" indent="-228600" defTabSz="457200" eaLnBrk="0" fontAlgn="base" hangingPunct="0">
+              <a:spcBef>
+                <a:spcPct val="0"/>
+              </a:spcBef>
+              <a:spcAft>
+                <a:spcPct val="0"/>
+              </a:spcAft>
+              <a:defRPr sz="2400">
+                <a:solidFill>
+                  <a:schemeClr val="tx1"/>
+                </a:solidFill>
+                <a:latin typeface="Arial" panose="020B0604020202020204" pitchFamily="34" charset="0"/>
+                <a:ea typeface="MS PGothic" panose="020B0600070205080204" pitchFamily="34" charset="-128"/>
+              </a:defRPr>
+            </a:lvl7pPr>
+            <a:lvl8pPr marL="3429000" indent="-228600" defTabSz="457200" eaLnBrk="0" fontAlgn="base" hangingPunct="0">
+              <a:spcBef>
+                <a:spcPct val="0"/>
+              </a:spcBef>
+              <a:spcAft>
+                <a:spcPct val="0"/>
+              </a:spcAft>
+              <a:defRPr sz="2400">
+                <a:solidFill>
+                  <a:schemeClr val="tx1"/>
+                </a:solidFill>
+                <a:latin typeface="Arial" panose="020B0604020202020204" pitchFamily="34" charset="0"/>
+                <a:ea typeface="MS PGothic" panose="020B0600070205080204" pitchFamily="34" charset="-128"/>
+              </a:defRPr>
+            </a:lvl8pPr>
+            <a:lvl9pPr marL="3886200" indent="-228600" defTabSz="457200" eaLnBrk="0" fontAlgn="base" hangingPunct="0">
+              <a:spcBef>
+                <a:spcPct val="0"/>
+              </a:spcBef>
+              <a:spcAft>
+                <a:spcPct val="0"/>
+              </a:spcAft>
+              <a:defRPr sz="2400">
+                <a:solidFill>
+                  <a:schemeClr val="tx1"/>
+                </a:solidFill>
+                <a:latin typeface="Arial" panose="020B0604020202020204" pitchFamily="34" charset="0"/>
+                <a:ea typeface="MS PGothic" panose="020B0600070205080204" pitchFamily="34" charset="-128"/>
+              </a:defRPr>
+            </a:lvl9pPr>
+          </a:lstStyle>
+          <a:p>
+            <a:r>
+              <a:rPr lang="en-US" altLang="it-IT" sz="6000">
+                <a:solidFill>
+                  <a:srgbClr val="FFFFFF"/>
+                </a:solidFill>
+                <a:latin typeface="Tw Cen MT" panose="020B0602020104020603" pitchFamily="34" charset="0"/>
+              </a:rPr>
+              <a:t>Conclusions</a:t>
+            </a:r>
+            <a:endParaRPr lang="en-US" altLang="it-IT" sz="6000" dirty="0">
+              <a:solidFill>
+                <a:srgbClr val="FFFFFF"/>
+              </a:solidFill>
+              <a:latin typeface="Tw Cen MT" panose="020B0602020104020603" pitchFamily="34" charset="0"/>
+            </a:endParaRPr>
+          </a:p>
+        </p:txBody>
+      </p:sp>
+      <p:sp>
+        <p:nvSpPr>
+          <p:cNvPr id="13" name="Rettangolo 12">
+            <a:extLst>
+              <a:ext uri="{FF2B5EF4-FFF2-40B4-BE49-F238E27FC236}">
+                <a16:creationId xmlns:a16="http://schemas.microsoft.com/office/drawing/2014/main" id="{1B3E0C32-1984-4560-966F-A08D7A1991F2}"/>
+              </a:ext>
+            </a:extLst>
+          </p:cNvPr>
+          <p:cNvSpPr/>
+          <p:nvPr/>
+        </p:nvSpPr>
+        <p:spPr>
+          <a:xfrm>
+            <a:off x="0" y="6408477"/>
+            <a:ext cx="2175339" cy="461665"/>
+          </a:xfrm>
+          <a:prstGeom prst="rect">
+            <a:avLst/>
+          </a:prstGeom>
+        </p:spPr>
+        <p:txBody>
+          <a:bodyPr wrap="none">
+            <a:spAutoFit/>
+          </a:bodyPr>
+          <a:lstStyle/>
+          <a:p>
+            <a:pPr eaLnBrk="1" hangingPunct="1">
+              <a:spcBef>
+                <a:spcPct val="20000"/>
+              </a:spcBef>
+            </a:pPr>
+            <a:r>
+              <a:rPr lang="en-US" altLang="it-IT" sz="2400" dirty="0">
+                <a:solidFill>
+                  <a:srgbClr val="000000"/>
+                </a:solidFill>
+                <a:latin typeface="Garamond" panose="02020404030301010803" pitchFamily="18" charset="0"/>
+              </a:rPr>
+              <a:t>Ivancich Stefano</a:t>
+            </a:r>
+          </a:p>
+        </p:txBody>
+      </p:sp>
+      <p:sp>
+        <p:nvSpPr>
+          <p:cNvPr id="14" name="Rettangolo 13">
+            <a:extLst>
+              <a:ext uri="{FF2B5EF4-FFF2-40B4-BE49-F238E27FC236}">
+                <a16:creationId xmlns:a16="http://schemas.microsoft.com/office/drawing/2014/main" id="{E8459245-DDCF-4A55-8FE9-5CF48972E537}"/>
+              </a:ext>
+            </a:extLst>
+          </p:cNvPr>
+          <p:cNvSpPr/>
+          <p:nvPr/>
+        </p:nvSpPr>
+        <p:spPr>
+          <a:xfrm>
+            <a:off x="8670794" y="6413034"/>
+            <a:ext cx="473206" cy="461665"/>
+          </a:xfrm>
+          <a:prstGeom prst="rect">
+            <a:avLst/>
+          </a:prstGeom>
+        </p:spPr>
+        <p:txBody>
+          <a:bodyPr wrap="none">
+            <a:spAutoFit/>
+          </a:bodyPr>
+          <a:lstStyle/>
+          <a:p>
+            <a:pPr eaLnBrk="1" hangingPunct="1">
+              <a:spcBef>
+                <a:spcPct val="20000"/>
+              </a:spcBef>
+            </a:pPr>
+            <a:r>
+              <a:rPr lang="en-US" altLang="it-IT" sz="2400" dirty="0">
+                <a:solidFill>
+                  <a:srgbClr val="000000"/>
+                </a:solidFill>
+                <a:latin typeface="Garamond" panose="02020404030301010803" pitchFamily="18" charset="0"/>
+              </a:rPr>
+              <a:t>11</a:t>
+            </a:r>
+          </a:p>
+        </p:txBody>
+      </p:sp>
+      <p:sp>
+        <p:nvSpPr>
+          <p:cNvPr id="15" name="Rettangolo 14">
+            <a:extLst>
+              <a:ext uri="{FF2B5EF4-FFF2-40B4-BE49-F238E27FC236}">
+                <a16:creationId xmlns:a16="http://schemas.microsoft.com/office/drawing/2014/main" id="{CDC0EA93-AE21-4D2B-BBA9-8CFFCDEC2B60}"/>
+              </a:ext>
+            </a:extLst>
+          </p:cNvPr>
+          <p:cNvSpPr/>
+          <p:nvPr/>
+        </p:nvSpPr>
+        <p:spPr>
+          <a:xfrm>
+            <a:off x="3747735" y="6420772"/>
+            <a:ext cx="1648528" cy="461665"/>
+          </a:xfrm>
+          <a:prstGeom prst="rect">
+            <a:avLst/>
+          </a:prstGeom>
+        </p:spPr>
+        <p:txBody>
+          <a:bodyPr wrap="none">
+            <a:spAutoFit/>
+          </a:bodyPr>
+          <a:lstStyle/>
+          <a:p>
+            <a:pPr eaLnBrk="1" hangingPunct="1">
+              <a:spcBef>
+                <a:spcPct val="20000"/>
+              </a:spcBef>
+            </a:pPr>
+            <a:r>
+              <a:rPr lang="en-US" altLang="it-IT" sz="2400" dirty="0">
+                <a:solidFill>
+                  <a:srgbClr val="000000"/>
+                </a:solidFill>
+                <a:latin typeface="Garamond" panose="02020404030301010803" pitchFamily="18" charset="0"/>
+              </a:rPr>
+              <a:t>15 July 2019</a:t>
+            </a:r>
+          </a:p>
+        </p:txBody>
+      </p:sp>
+      <p:sp>
+        <p:nvSpPr>
+          <p:cNvPr id="7" name="Rectangle 6">
+            <a:extLst>
+              <a:ext uri="{FF2B5EF4-FFF2-40B4-BE49-F238E27FC236}">
+                <a16:creationId xmlns:a16="http://schemas.microsoft.com/office/drawing/2014/main" id="{D1C770D5-0432-4218-8BC0-C9B6BA7FF1ED}"/>
+              </a:ext>
+            </a:extLst>
+          </p:cNvPr>
+          <p:cNvSpPr>
+            <a:spLocks noChangeArrowheads="1"/>
+          </p:cNvSpPr>
+          <p:nvPr/>
+        </p:nvSpPr>
+        <p:spPr bwMode="auto">
+          <a:xfrm>
+            <a:off x="272255" y="1181692"/>
+            <a:ext cx="8599487" cy="5073389"/>
+          </a:xfrm>
+          <a:prstGeom prst="rect">
+            <a:avLst/>
+          </a:prstGeom>
+          <a:noFill/>
+          <a:ln w="9525">
+            <a:noFill/>
+            <a:miter lim="800000"/>
+            <a:headEnd/>
+            <a:tailEnd/>
+          </a:ln>
+          <a:extLst>
+            <a:ext uri="{909E8E84-426E-40DD-AFC4-6F175D3DCCD1}">
+              <a14:hiddenFill xmlns:a14="http://schemas.microsoft.com/office/drawing/2010/main">
+                <a:solidFill>
+                  <a:srgbClr val="FFFFFF"/>
+                </a:solidFill>
+              </a14:hiddenFill>
+            </a:ext>
+          </a:extLst>
+        </p:spPr>
+        <p:txBody>
+          <a:bodyPr/>
+          <a:lstStyle>
+            <a:lvl1pPr eaLnBrk="0" hangingPunct="0">
+              <a:defRPr sz="2400">
+                <a:solidFill>
+                  <a:schemeClr val="tx1"/>
+                </a:solidFill>
+                <a:latin typeface="Arial" panose="020B0604020202020204" pitchFamily="34" charset="0"/>
+                <a:ea typeface="MS PGothic" panose="020B0600070205080204" pitchFamily="34" charset="-128"/>
+              </a:defRPr>
+            </a:lvl1pPr>
+            <a:lvl2pPr marL="742950" indent="-285750" eaLnBrk="0" hangingPunct="0">
+              <a:defRPr sz="2400">
+                <a:solidFill>
+                  <a:schemeClr val="tx1"/>
+                </a:solidFill>
+                <a:latin typeface="Arial" panose="020B0604020202020204" pitchFamily="34" charset="0"/>
+                <a:ea typeface="MS PGothic" panose="020B0600070205080204" pitchFamily="34" charset="-128"/>
+              </a:defRPr>
+            </a:lvl2pPr>
+            <a:lvl3pPr marL="1143000" indent="-228600" eaLnBrk="0" hangingPunct="0">
+              <a:defRPr sz="2400">
+                <a:solidFill>
+                  <a:schemeClr val="tx1"/>
+                </a:solidFill>
+                <a:latin typeface="Arial" panose="020B0604020202020204" pitchFamily="34" charset="0"/>
+                <a:ea typeface="MS PGothic" panose="020B0600070205080204" pitchFamily="34" charset="-128"/>
+              </a:defRPr>
+            </a:lvl3pPr>
+            <a:lvl4pPr marL="1600200" indent="-228600" eaLnBrk="0" hangingPunct="0">
+              <a:defRPr sz="2400">
+                <a:solidFill>
+                  <a:schemeClr val="tx1"/>
+                </a:solidFill>
+                <a:latin typeface="Arial" panose="020B0604020202020204" pitchFamily="34" charset="0"/>
+                <a:ea typeface="MS PGothic" panose="020B0600070205080204" pitchFamily="34" charset="-128"/>
+              </a:defRPr>
+            </a:lvl4pPr>
+            <a:lvl5pPr marL="2057400" indent="-228600" eaLnBrk="0" hangingPunct="0">
+              <a:defRPr sz="2400">
+                <a:solidFill>
+                  <a:schemeClr val="tx1"/>
+                </a:solidFill>
+                <a:latin typeface="Arial" panose="020B0604020202020204" pitchFamily="34" charset="0"/>
+                <a:ea typeface="MS PGothic" panose="020B0600070205080204" pitchFamily="34" charset="-128"/>
+              </a:defRPr>
+            </a:lvl5pPr>
+            <a:lvl6pPr marL="2514600" indent="-228600" defTabSz="457200" eaLnBrk="0" fontAlgn="base" hangingPunct="0">
+              <a:spcBef>
+                <a:spcPct val="0"/>
+              </a:spcBef>
+              <a:spcAft>
+                <a:spcPct val="0"/>
+              </a:spcAft>
+              <a:defRPr sz="2400">
+                <a:solidFill>
+                  <a:schemeClr val="tx1"/>
+                </a:solidFill>
+                <a:latin typeface="Arial" panose="020B0604020202020204" pitchFamily="34" charset="0"/>
+                <a:ea typeface="MS PGothic" panose="020B0600070205080204" pitchFamily="34" charset="-128"/>
+              </a:defRPr>
+            </a:lvl6pPr>
+            <a:lvl7pPr marL="2971800" indent="-228600" defTabSz="457200" eaLnBrk="0" fontAlgn="base" hangingPunct="0">
+              <a:spcBef>
+                <a:spcPct val="0"/>
+              </a:spcBef>
+              <a:spcAft>
+                <a:spcPct val="0"/>
+              </a:spcAft>
+              <a:defRPr sz="2400">
+                <a:solidFill>
+                  <a:schemeClr val="tx1"/>
+                </a:solidFill>
+                <a:latin typeface="Arial" panose="020B0604020202020204" pitchFamily="34" charset="0"/>
+                <a:ea typeface="MS PGothic" panose="020B0600070205080204" pitchFamily="34" charset="-128"/>
+              </a:defRPr>
+            </a:lvl7pPr>
+            <a:lvl8pPr marL="3429000" indent="-228600" defTabSz="457200" eaLnBrk="0" fontAlgn="base" hangingPunct="0">
+              <a:spcBef>
+                <a:spcPct val="0"/>
+              </a:spcBef>
+              <a:spcAft>
+                <a:spcPct val="0"/>
+              </a:spcAft>
+              <a:defRPr sz="2400">
+                <a:solidFill>
+                  <a:schemeClr val="tx1"/>
+                </a:solidFill>
+                <a:latin typeface="Arial" panose="020B0604020202020204" pitchFamily="34" charset="0"/>
+                <a:ea typeface="MS PGothic" panose="020B0600070205080204" pitchFamily="34" charset="-128"/>
+              </a:defRPr>
+            </a:lvl8pPr>
+            <a:lvl9pPr marL="3886200" indent="-228600" defTabSz="457200" eaLnBrk="0" fontAlgn="base" hangingPunct="0">
+              <a:spcBef>
+                <a:spcPct val="0"/>
+              </a:spcBef>
+              <a:spcAft>
+                <a:spcPct val="0"/>
+              </a:spcAft>
+              <a:defRPr sz="2400">
+                <a:solidFill>
+                  <a:schemeClr val="tx1"/>
+                </a:solidFill>
+                <a:latin typeface="Arial" panose="020B0604020202020204" pitchFamily="34" charset="0"/>
+                <a:ea typeface="MS PGothic" panose="020B0600070205080204" pitchFamily="34" charset="-128"/>
+              </a:defRPr>
+            </a:lvl9pPr>
+          </a:lstStyle>
+          <a:p>
+            <a:pPr eaLnBrk="1" hangingPunct="1">
+              <a:spcBef>
+                <a:spcPct val="20000"/>
+              </a:spcBef>
+            </a:pPr>
+            <a:r>
               <a:rPr lang="en-US" altLang="it-IT" sz="2200" b="1" dirty="0">
                 <a:solidFill>
                   <a:srgbClr val="000000"/>
@@ -9223,7 +9754,7 @@
 </p:sld>
 </file>
 
-<file path=ppt/slides/slide14.xml><?xml version="1.0" encoding="utf-8"?>
+<file path=ppt/slides/slide15.xml><?xml version="1.0" encoding="utf-8"?>
 <p:sld xmlns:a="http://schemas.openxmlformats.org/drawingml/2006/main" xmlns:r="http://schemas.openxmlformats.org/officeDocument/2006/relationships" xmlns:p="http://schemas.openxmlformats.org/presentationml/2006/main">
   <p:cSld>
     <p:spTree>
@@ -10239,6 +10770,24 @@
                 </a:solidFill>
                 <a:latin typeface="Garamond" panose="02020404030301010803" pitchFamily="18" charset="0"/>
               </a:rPr>
+              <a:t>The Solution</a:t>
+            </a:r>
+          </a:p>
+          <a:p>
+            <a:pPr marL="342900" indent="-342900" eaLnBrk="1" hangingPunct="1">
+              <a:spcBef>
+                <a:spcPct val="20000"/>
+              </a:spcBef>
+              <a:buFont typeface="Arial" panose="020B0604020202020204" pitchFamily="34" charset="0"/>
+              <a:buChar char="•"/>
+            </a:pPr>
+            <a:r>
+              <a:rPr lang="en-US" altLang="it-IT" sz="2200" dirty="0">
+                <a:solidFill>
+                  <a:srgbClr val="000000"/>
+                </a:solidFill>
+                <a:latin typeface="Garamond" panose="02020404030301010803" pitchFamily="18" charset="0"/>
+              </a:rPr>
               <a:t>How we have tackled it</a:t>
             </a:r>
           </a:p>
@@ -11031,7 +11580,7 @@
                 </a:solidFill>
                 <a:latin typeface="Tw Cen MT" panose="020B0602020104020603" pitchFamily="34" charset="0"/>
               </a:rPr>
-              <a:t>How we have tackled it</a:t>
+              <a:t>The Solution</a:t>
             </a:r>
           </a:p>
         </p:txBody>
@@ -11119,7 +11668,7 @@
                 </a:solidFill>
                 <a:latin typeface="Garamond" panose="02020404030301010803" pitchFamily="18" charset="0"/>
               </a:rPr>
-              <a:t>3</a:t>
+              <a:t>2</a:t>
             </a:r>
             <a:endParaRPr lang="en-US" altLang="it-IT" sz="1800" dirty="0">
               <a:solidFill>
@@ -11323,31 +11872,6 @@
             </a:lvl9pPr>
           </a:lstStyle>
           <a:p>
-            <a:pPr eaLnBrk="1" hangingPunct="1">
-              <a:spcBef>
-                <a:spcPct val="20000"/>
-              </a:spcBef>
-            </a:pPr>
-            <a:r>
-              <a:rPr lang="en-US" altLang="it-IT" sz="2200" b="1" dirty="0">
-                <a:solidFill>
-                  <a:srgbClr val="000000"/>
-                </a:solidFill>
-                <a:latin typeface="Garamond" panose="02020404030301010803" pitchFamily="18" charset="0"/>
-              </a:rPr>
-              <a:t>1) Literature</a:t>
-            </a:r>
-            <a:r>
-              <a:rPr lang="en-US" altLang="it-IT" sz="2200" dirty="0">
-                <a:solidFill>
-                  <a:srgbClr val="000000"/>
-                </a:solidFill>
-                <a:latin typeface="Garamond" panose="02020404030301010803" pitchFamily="18" charset="0"/>
-              </a:rPr>
-              <a:t> from:</a:t>
-            </a:r>
-          </a:p>
-          <a:p>
             <a:pPr marL="342900" indent="-342900" eaLnBrk="1" hangingPunct="1">
               <a:spcBef>
                 <a:spcPct val="20000"/>
@@ -11362,507 +11886,15 @@
                 </a:solidFill>
                 <a:latin typeface="Garamond" panose="02020404030301010803" pitchFamily="18" charset="0"/>
               </a:rPr>
-              <a:t>Teacher’s material</a:t>
-            </a:r>
-          </a:p>
-          <a:p>
-            <a:pPr marL="342900" indent="-342900" eaLnBrk="1" hangingPunct="1">
-              <a:spcBef>
-                <a:spcPct val="20000"/>
-              </a:spcBef>
-              <a:buFont typeface="Arial" panose="020B0604020202020204" pitchFamily="34" charset="0"/>
-              <a:buChar char="•"/>
-            </a:pPr>
-            <a:r>
-              <a:rPr lang="en-US" altLang="it-IT" sz="2200" dirty="0" err="1">
-                <a:solidFill>
-                  <a:srgbClr val="000000"/>
-                </a:solidFill>
-                <a:latin typeface="Garamond" panose="02020404030301010803" pitchFamily="18" charset="0"/>
-              </a:rPr>
-              <a:t>ArchiveX</a:t>
-            </a:r>
-            <a:endParaRPr lang="en-US" altLang="it-IT" sz="2200" dirty="0">
-              <a:solidFill>
-                <a:srgbClr val="000000"/>
-              </a:solidFill>
-              <a:latin typeface="Garamond" panose="02020404030301010803" pitchFamily="18" charset="0"/>
-            </a:endParaRPr>
-          </a:p>
-          <a:p>
-            <a:pPr marL="342900" indent="-342900" eaLnBrk="1" hangingPunct="1">
-              <a:spcBef>
-                <a:spcPct val="20000"/>
-              </a:spcBef>
-              <a:buFont typeface="Arial" panose="020B0604020202020204" pitchFamily="34" charset="0"/>
-              <a:buChar char="•"/>
-            </a:pPr>
-            <a:r>
-              <a:rPr lang="en-US" altLang="it-IT" sz="2200" dirty="0">
-                <a:solidFill>
-                  <a:srgbClr val="000000"/>
-                </a:solidFill>
-                <a:latin typeface="Garamond" panose="02020404030301010803" pitchFamily="18" charset="0"/>
-              </a:rPr>
-              <a:t>paperswithcode.com</a:t>
-            </a:r>
-          </a:p>
-          <a:p>
-            <a:pPr marL="342900" indent="-342900" eaLnBrk="1" hangingPunct="1">
-              <a:spcBef>
-                <a:spcPct val="20000"/>
-              </a:spcBef>
-              <a:buFont typeface="Arial" panose="020B0604020202020204" pitchFamily="34" charset="0"/>
-              <a:buChar char="•"/>
-            </a:pPr>
-            <a:r>
-              <a:rPr lang="en-US" altLang="it-IT" sz="2200" dirty="0">
-                <a:solidFill>
-                  <a:srgbClr val="000000"/>
-                </a:solidFill>
-                <a:latin typeface="Garamond" panose="02020404030301010803" pitchFamily="18" charset="0"/>
-              </a:rPr>
-              <a:t>Reddit</a:t>
-            </a:r>
-          </a:p>
-          <a:p>
-            <a:pPr marL="342900" indent="-342900" eaLnBrk="1" hangingPunct="1">
-              <a:spcBef>
-                <a:spcPct val="20000"/>
-              </a:spcBef>
-              <a:buFont typeface="Arial" panose="020B0604020202020204" pitchFamily="34" charset="0"/>
-              <a:buChar char="•"/>
-            </a:pPr>
-            <a:r>
-              <a:rPr lang="en-US" altLang="it-IT" sz="2200" dirty="0">
-                <a:solidFill>
-                  <a:srgbClr val="000000"/>
-                </a:solidFill>
-                <a:latin typeface="Garamond" panose="02020404030301010803" pitchFamily="18" charset="0"/>
-              </a:rPr>
-              <a:t>GitHub</a:t>
-            </a:r>
-          </a:p>
-          <a:p>
-            <a:pPr marL="342900" indent="-342900" eaLnBrk="1" hangingPunct="1">
-              <a:spcBef>
-                <a:spcPct val="20000"/>
-              </a:spcBef>
-              <a:buFont typeface="Arial" panose="020B0604020202020204" pitchFamily="34" charset="0"/>
-              <a:buChar char="•"/>
-            </a:pPr>
-            <a:r>
-              <a:rPr lang="en-US" altLang="it-IT" sz="2200" dirty="0">
-                <a:solidFill>
-                  <a:srgbClr val="000000"/>
-                </a:solidFill>
-                <a:latin typeface="Garamond" panose="02020404030301010803" pitchFamily="18" charset="0"/>
-              </a:rPr>
-              <a:t>Paper’s references</a:t>
-            </a:r>
-          </a:p>
-          <a:p>
-            <a:pPr eaLnBrk="1" hangingPunct="1">
-              <a:spcBef>
-                <a:spcPct val="20000"/>
-              </a:spcBef>
-            </a:pPr>
-            <a:endParaRPr lang="en-US" altLang="it-IT" sz="2200" b="1" dirty="0">
-              <a:solidFill>
-                <a:srgbClr val="000000"/>
-              </a:solidFill>
-              <a:latin typeface="Garamond" panose="02020404030301010803" pitchFamily="18" charset="0"/>
-            </a:endParaRPr>
-          </a:p>
-          <a:p>
-            <a:pPr eaLnBrk="1" hangingPunct="1">
-              <a:spcBef>
-                <a:spcPct val="20000"/>
-              </a:spcBef>
-            </a:pPr>
-            <a:r>
-              <a:rPr lang="en-US" altLang="it-IT" sz="2200" b="1" dirty="0">
-                <a:solidFill>
-                  <a:srgbClr val="000000"/>
-                </a:solidFill>
-                <a:latin typeface="Garamond" panose="02020404030301010803" pitchFamily="18" charset="0"/>
-              </a:rPr>
-              <a:t>2) For each paper</a:t>
-            </a:r>
-            <a:r>
-              <a:rPr lang="en-US" altLang="it-IT" sz="2200" dirty="0">
-                <a:solidFill>
-                  <a:srgbClr val="000000"/>
-                </a:solidFill>
-                <a:latin typeface="Garamond" panose="02020404030301010803" pitchFamily="18" charset="0"/>
-              </a:rPr>
-              <a:t>:</a:t>
-            </a:r>
-          </a:p>
-          <a:p>
-            <a:pPr marL="342900" indent="-342900" eaLnBrk="1" hangingPunct="1">
-              <a:spcBef>
-                <a:spcPct val="20000"/>
-              </a:spcBef>
-              <a:buFont typeface="Arial" panose="020B0604020202020204" pitchFamily="34" charset="0"/>
-              <a:buChar char="•"/>
-            </a:pPr>
-            <a:r>
-              <a:rPr lang="en-US" altLang="it-IT" sz="2200" dirty="0">
-                <a:solidFill>
-                  <a:srgbClr val="000000"/>
-                </a:solidFill>
-                <a:latin typeface="Garamond" panose="02020404030301010803" pitchFamily="18" charset="0"/>
-              </a:rPr>
-              <a:t>What we find useful for our problem?</a:t>
-            </a:r>
-          </a:p>
-          <a:p>
-            <a:pPr marL="342900" indent="-342900" eaLnBrk="1" hangingPunct="1">
-              <a:spcBef>
-                <a:spcPct val="20000"/>
-              </a:spcBef>
-              <a:buFont typeface="Arial" panose="020B0604020202020204" pitchFamily="34" charset="0"/>
-              <a:buChar char="•"/>
-            </a:pPr>
-            <a:r>
-              <a:rPr lang="en-US" altLang="it-IT" sz="2200" dirty="0">
-                <a:solidFill>
-                  <a:srgbClr val="000000"/>
-                </a:solidFill>
-                <a:latin typeface="Garamond" panose="02020404030301010803" pitchFamily="18" charset="0"/>
-              </a:rPr>
-              <a:t>Which references we want to follow?</a:t>
-            </a:r>
-          </a:p>
-          <a:p>
-            <a:pPr eaLnBrk="1" hangingPunct="1">
-              <a:spcBef>
-                <a:spcPct val="20000"/>
-              </a:spcBef>
-            </a:pPr>
-            <a:endParaRPr lang="en-US" altLang="it-IT" sz="2200" dirty="0">
-              <a:solidFill>
-                <a:srgbClr val="000000"/>
-              </a:solidFill>
-              <a:latin typeface="Garamond" panose="02020404030301010803" pitchFamily="18" charset="0"/>
-            </a:endParaRPr>
-          </a:p>
-          <a:p>
-            <a:pPr marL="342900" indent="-342900" eaLnBrk="1" hangingPunct="1">
-              <a:spcBef>
-                <a:spcPct val="20000"/>
-              </a:spcBef>
-              <a:buFont typeface="Arial" panose="020B0604020202020204" pitchFamily="34" charset="0"/>
-              <a:buChar char="•"/>
-            </a:pPr>
-            <a:endParaRPr lang="en-US" altLang="it-IT" sz="2200" dirty="0">
-              <a:solidFill>
-                <a:srgbClr val="000000"/>
-              </a:solidFill>
-              <a:latin typeface="Garamond" panose="02020404030301010803" pitchFamily="18" charset="0"/>
-            </a:endParaRPr>
-          </a:p>
-          <a:p>
-            <a:pPr marL="342900" indent="-342900" eaLnBrk="1" hangingPunct="1">
-              <a:spcBef>
-                <a:spcPct val="20000"/>
-              </a:spcBef>
-              <a:buFont typeface="Arial" panose="020B0604020202020204" pitchFamily="34" charset="0"/>
-              <a:buChar char="•"/>
-            </a:pPr>
-            <a:endParaRPr lang="en-US" altLang="it-IT" sz="2200" dirty="0">
-              <a:solidFill>
-                <a:srgbClr val="000000"/>
-              </a:solidFill>
-              <a:latin typeface="Garamond" panose="02020404030301010803" pitchFamily="18" charset="0"/>
-            </a:endParaRPr>
-          </a:p>
-          <a:p>
-            <a:pPr marL="342900" indent="-342900" eaLnBrk="1" hangingPunct="1">
-              <a:spcBef>
-                <a:spcPct val="20000"/>
-              </a:spcBef>
-              <a:buFont typeface="Arial" panose="020B0604020202020204" pitchFamily="34" charset="0"/>
-              <a:buChar char="•"/>
-            </a:pPr>
-            <a:endParaRPr lang="en-US" altLang="it-IT" sz="2200" dirty="0">
-              <a:solidFill>
-                <a:srgbClr val="000000"/>
-              </a:solidFill>
-              <a:latin typeface="Garamond" panose="02020404030301010803" pitchFamily="18" charset="0"/>
-            </a:endParaRPr>
-          </a:p>
-        </p:txBody>
-      </p:sp>
-      <p:cxnSp>
-        <p:nvCxnSpPr>
-          <p:cNvPr id="27" name="Connettore diritto 26">
-            <a:extLst>
-              <a:ext uri="{FF2B5EF4-FFF2-40B4-BE49-F238E27FC236}">
-                <a16:creationId xmlns:a16="http://schemas.microsoft.com/office/drawing/2014/main" id="{B0F260F5-F52D-4DD0-8890-EF9D873C4802}"/>
-              </a:ext>
-            </a:extLst>
-          </p:cNvPr>
-          <p:cNvCxnSpPr>
-            <a:cxnSpLocks/>
-          </p:cNvCxnSpPr>
-          <p:nvPr/>
-        </p:nvCxnSpPr>
-        <p:spPr>
-          <a:xfrm flipV="1">
-            <a:off x="5080000" y="3814619"/>
-            <a:ext cx="0" cy="1625599"/>
-          </a:xfrm>
-          <a:prstGeom prst="line">
-            <a:avLst/>
-          </a:prstGeom>
-          <a:ln w="57150"/>
-        </p:spPr>
-        <p:style>
-          <a:lnRef idx="2">
-            <a:schemeClr val="dk1"/>
-          </a:lnRef>
-          <a:fillRef idx="0">
-            <a:schemeClr val="dk1"/>
-          </a:fillRef>
-          <a:effectRef idx="1">
-            <a:schemeClr val="dk1"/>
-          </a:effectRef>
-          <a:fontRef idx="minor">
-            <a:schemeClr val="tx1"/>
-          </a:fontRef>
-        </p:style>
-      </p:cxnSp>
-      <p:cxnSp>
-        <p:nvCxnSpPr>
-          <p:cNvPr id="29" name="Connettore diritto 28">
-            <a:extLst>
-              <a:ext uri="{FF2B5EF4-FFF2-40B4-BE49-F238E27FC236}">
-                <a16:creationId xmlns:a16="http://schemas.microsoft.com/office/drawing/2014/main" id="{FCF7879F-803F-475D-872E-F3543533547B}"/>
-              </a:ext>
-            </a:extLst>
-          </p:cNvPr>
-          <p:cNvCxnSpPr/>
-          <p:nvPr/>
-        </p:nvCxnSpPr>
-        <p:spPr>
-          <a:xfrm flipH="1">
-            <a:off x="4645891" y="5440218"/>
-            <a:ext cx="434109" cy="0"/>
-          </a:xfrm>
-          <a:prstGeom prst="line">
-            <a:avLst/>
-          </a:prstGeom>
-          <a:ln w="57150"/>
-        </p:spPr>
-        <p:style>
-          <a:lnRef idx="2">
-            <a:schemeClr val="dk1"/>
-          </a:lnRef>
-          <a:fillRef idx="0">
-            <a:schemeClr val="dk1"/>
-          </a:fillRef>
-          <a:effectRef idx="1">
-            <a:schemeClr val="dk1"/>
-          </a:effectRef>
-          <a:fontRef idx="minor">
-            <a:schemeClr val="tx1"/>
-          </a:fontRef>
-        </p:style>
-      </p:cxnSp>
-      <p:cxnSp>
-        <p:nvCxnSpPr>
-          <p:cNvPr id="31" name="Connettore 2 30">
-            <a:extLst>
-              <a:ext uri="{FF2B5EF4-FFF2-40B4-BE49-F238E27FC236}">
-                <a16:creationId xmlns:a16="http://schemas.microsoft.com/office/drawing/2014/main" id="{391DB72E-687B-4D0B-B74B-65C80262BE50}"/>
-              </a:ext>
-            </a:extLst>
-          </p:cNvPr>
-          <p:cNvCxnSpPr>
-            <a:cxnSpLocks/>
-          </p:cNvCxnSpPr>
-          <p:nvPr/>
-        </p:nvCxnSpPr>
-        <p:spPr>
-          <a:xfrm flipH="1">
-            <a:off x="2514519" y="3814618"/>
-            <a:ext cx="2565481" cy="0"/>
-          </a:xfrm>
-          <a:prstGeom prst="straightConnector1">
-            <a:avLst/>
-          </a:prstGeom>
-          <a:ln w="57150">
-            <a:tailEnd type="triangle"/>
-          </a:ln>
-        </p:spPr>
-        <p:style>
-          <a:lnRef idx="2">
-            <a:schemeClr val="dk1"/>
-          </a:lnRef>
-          <a:fillRef idx="0">
-            <a:schemeClr val="dk1"/>
-          </a:fillRef>
-          <a:effectRef idx="1">
-            <a:schemeClr val="dk1"/>
-          </a:effectRef>
-          <a:fontRef idx="minor">
-            <a:schemeClr val="tx1"/>
-          </a:fontRef>
-        </p:style>
-      </p:cxnSp>
-      <p:cxnSp>
-        <p:nvCxnSpPr>
-          <p:cNvPr id="38" name="Connettore 2 37">
-            <a:extLst>
-              <a:ext uri="{FF2B5EF4-FFF2-40B4-BE49-F238E27FC236}">
-                <a16:creationId xmlns:a16="http://schemas.microsoft.com/office/drawing/2014/main" id="{CEE1484F-3EA3-43CF-BCBC-9194988DDF2D}"/>
-              </a:ext>
-            </a:extLst>
-          </p:cNvPr>
-          <p:cNvCxnSpPr>
-            <a:cxnSpLocks/>
-          </p:cNvCxnSpPr>
-          <p:nvPr/>
-        </p:nvCxnSpPr>
-        <p:spPr>
-          <a:xfrm>
-            <a:off x="4729018" y="5006109"/>
-            <a:ext cx="1191491" cy="0"/>
-          </a:xfrm>
-          <a:prstGeom prst="straightConnector1">
-            <a:avLst/>
-          </a:prstGeom>
-          <a:ln w="57150">
-            <a:tailEnd type="triangle"/>
-          </a:ln>
-        </p:spPr>
-        <p:style>
-          <a:lnRef idx="2">
-            <a:schemeClr val="dk1"/>
-          </a:lnRef>
-          <a:fillRef idx="0">
-            <a:schemeClr val="dk1"/>
-          </a:fillRef>
-          <a:effectRef idx="1">
-            <a:schemeClr val="dk1"/>
-          </a:effectRef>
-          <a:fontRef idx="minor">
-            <a:schemeClr val="tx1"/>
-          </a:fontRef>
-        </p:style>
-      </p:cxnSp>
-      <p:sp>
-        <p:nvSpPr>
-          <p:cNvPr id="40" name="Scorrimento verticale 39">
-            <a:extLst>
-              <a:ext uri="{FF2B5EF4-FFF2-40B4-BE49-F238E27FC236}">
-                <a16:creationId xmlns:a16="http://schemas.microsoft.com/office/drawing/2014/main" id="{2411E49C-415B-4F75-BFA0-7BFC2C1BD8C4}"/>
-              </a:ext>
-            </a:extLst>
-          </p:cNvPr>
-          <p:cNvSpPr/>
-          <p:nvPr/>
-        </p:nvSpPr>
-        <p:spPr>
-          <a:xfrm>
-            <a:off x="5717309" y="3680460"/>
-            <a:ext cx="2096655" cy="2574621"/>
-          </a:xfrm>
-          <a:prstGeom prst="verticalScroll">
-            <a:avLst/>
-          </a:prstGeom>
-        </p:spPr>
-        <p:style>
-          <a:lnRef idx="2">
-            <a:schemeClr val="dk1"/>
-          </a:lnRef>
-          <a:fillRef idx="1">
-            <a:schemeClr val="lt1"/>
-          </a:fillRef>
-          <a:effectRef idx="0">
-            <a:schemeClr val="dk1"/>
-          </a:effectRef>
-          <a:fontRef idx="minor">
-            <a:schemeClr val="dk1"/>
-          </a:fontRef>
-        </p:style>
-        <p:txBody>
-          <a:bodyPr rtlCol="0" anchor="ctr"/>
-          <a:lstStyle/>
-          <a:p>
-            <a:pPr marL="285750" indent="-285750">
-              <a:buFont typeface="Arial" panose="020B0604020202020204" pitchFamily="34" charset="0"/>
-              <a:buChar char="•"/>
-            </a:pPr>
-            <a:r>
-              <a:rPr lang="it-IT" dirty="0"/>
-              <a:t>Transformer</a:t>
-            </a:r>
-          </a:p>
-          <a:p>
-            <a:pPr marL="285750" indent="-285750">
-              <a:buFont typeface="Arial" panose="020B0604020202020204" pitchFamily="34" charset="0"/>
-              <a:buChar char="•"/>
-            </a:pPr>
-            <a:r>
-              <a:rPr lang="it-IT" dirty="0" err="1"/>
-              <a:t>Attention</a:t>
-            </a:r>
-            <a:endParaRPr lang="it-IT" dirty="0"/>
-          </a:p>
-          <a:p>
-            <a:pPr marL="285750" indent="-285750">
-              <a:buFont typeface="Arial" panose="020B0604020202020204" pitchFamily="34" charset="0"/>
-              <a:buChar char="•"/>
-            </a:pPr>
-            <a:r>
-              <a:rPr lang="it-IT" dirty="0"/>
-              <a:t>40 MFCC</a:t>
-            </a:r>
-          </a:p>
-          <a:p>
-            <a:pPr marL="285750" indent="-285750">
-              <a:buFont typeface="Arial" panose="020B0604020202020204" pitchFamily="34" charset="0"/>
-              <a:buChar char="•"/>
-            </a:pPr>
-            <a:r>
-              <a:rPr lang="it-IT" dirty="0" err="1"/>
-              <a:t>SincConv</a:t>
-            </a:r>
-            <a:endParaRPr lang="it-IT" dirty="0"/>
-          </a:p>
-          <a:p>
-            <a:pPr marL="285750" indent="-285750">
-              <a:buFont typeface="Arial" panose="020B0604020202020204" pitchFamily="34" charset="0"/>
-              <a:buChar char="•"/>
-            </a:pPr>
-            <a:r>
-              <a:rPr lang="it-IT" dirty="0"/>
-              <a:t>…</a:t>
-            </a:r>
-          </a:p>
-          <a:p>
-            <a:pPr marL="285750" indent="-285750">
-              <a:buFont typeface="Arial" panose="020B0604020202020204" pitchFamily="34" charset="0"/>
-              <a:buChar char="•"/>
-            </a:pPr>
-            <a:endParaRPr lang="it-IT" dirty="0"/>
-          </a:p>
-          <a:p>
-            <a:pPr marL="285750" indent="-285750" algn="just">
-              <a:buFont typeface="Arial" panose="020B0604020202020204" pitchFamily="34" charset="0"/>
-              <a:buChar char="•"/>
-            </a:pPr>
-            <a:endParaRPr lang="it-IT" dirty="0"/>
+              <a:t>SCHEMA PRODUCTION…..</a:t>
+            </a:r>
           </a:p>
         </p:txBody>
       </p:sp>
     </p:spTree>
     <p:extLst>
       <p:ext uri="{BB962C8B-B14F-4D97-AF65-F5344CB8AC3E}">
-        <p14:creationId xmlns:p14="http://schemas.microsoft.com/office/powerpoint/2010/main" val="3863927342"/>
+        <p14:creationId xmlns:p14="http://schemas.microsoft.com/office/powerpoint/2010/main" val="3698364492"/>
       </p:ext>
     </p:extLst>
   </p:cSld>
@@ -12140,7 +12172,7 @@
                 </a:solidFill>
                 <a:latin typeface="Garamond" panose="02020404030301010803" pitchFamily="18" charset="0"/>
               </a:rPr>
-              <a:t>4</a:t>
+              <a:t>3</a:t>
             </a:r>
             <a:endParaRPr lang="en-US" altLang="it-IT" sz="1800" dirty="0">
               <a:solidFill>
@@ -12356,7 +12388,7 @@
                 </a:solidFill>
                 <a:latin typeface="Garamond" panose="02020404030301010803" pitchFamily="18" charset="0"/>
               </a:rPr>
-              <a:t>3) Try to mix</a:t>
+              <a:t>1) Literature</a:t>
             </a:r>
             <a:r>
               <a:rPr lang="en-US" altLang="it-IT" sz="2200" dirty="0">
@@ -12365,23 +12397,7 @@
                 </a:solidFill>
                 <a:latin typeface="Garamond" panose="02020404030301010803" pitchFamily="18" charset="0"/>
               </a:rPr>
-              <a:t> from things written down</a:t>
-            </a:r>
-          </a:p>
-          <a:p>
-            <a:pPr eaLnBrk="1" hangingPunct="1">
-              <a:spcBef>
-                <a:spcPct val="20000"/>
-              </a:spcBef>
-            </a:pPr>
-            <a:r>
-              <a:rPr lang="en-US" altLang="it-IT" sz="2200" dirty="0">
-                <a:solidFill>
-                  <a:srgbClr val="000000"/>
-                </a:solidFill>
-                <a:latin typeface="Garamond" panose="02020404030301010803" pitchFamily="18" charset="0"/>
-              </a:rPr>
-              <a:t>Example:</a:t>
+              <a:t> from:</a:t>
             </a:r>
           </a:p>
           <a:p>
@@ -12399,7 +12415,7 @@
                 </a:solidFill>
                 <a:latin typeface="Garamond" panose="02020404030301010803" pitchFamily="18" charset="0"/>
               </a:rPr>
-              <a:t>Paper X says that Transformer is better than RNN because …</a:t>
+              <a:t>Teacher’s material</a:t>
             </a:r>
           </a:p>
           <a:p>
@@ -12411,13 +12427,91 @@
               <a:buChar char="•"/>
             </a:pPr>
             <a:r>
+              <a:rPr lang="en-US" altLang="it-IT" sz="2200" dirty="0" err="1">
+                <a:solidFill>
+                  <a:srgbClr val="000000"/>
+                </a:solidFill>
+                <a:latin typeface="Garamond" panose="02020404030301010803" pitchFamily="18" charset="0"/>
+              </a:rPr>
+              <a:t>ArchiveX</a:t>
+            </a:r>
+            <a:endParaRPr lang="en-US" altLang="it-IT" sz="2200" dirty="0">
+              <a:solidFill>
+                <a:srgbClr val="000000"/>
+              </a:solidFill>
+              <a:latin typeface="Garamond" panose="02020404030301010803" pitchFamily="18" charset="0"/>
+            </a:endParaRPr>
+          </a:p>
+          <a:p>
+            <a:pPr marL="342900" indent="-342900" eaLnBrk="1" hangingPunct="1">
+              <a:spcBef>
+                <a:spcPct val="20000"/>
+              </a:spcBef>
+              <a:buFont typeface="Arial" panose="020B0604020202020204" pitchFamily="34" charset="0"/>
+              <a:buChar char="•"/>
+            </a:pPr>
+            <a:r>
               <a:rPr lang="en-US" altLang="it-IT" sz="2200" dirty="0">
                 <a:solidFill>
                   <a:srgbClr val="000000"/>
                 </a:solidFill>
                 <a:latin typeface="Garamond" panose="02020404030301010803" pitchFamily="18" charset="0"/>
               </a:rPr>
-              <a:t>Paper Y says that Attention Mechanism … is good for KWS ….</a:t>
+              <a:t>paperswithcode.com</a:t>
+            </a:r>
+          </a:p>
+          <a:p>
+            <a:pPr marL="342900" indent="-342900" eaLnBrk="1" hangingPunct="1">
+              <a:spcBef>
+                <a:spcPct val="20000"/>
+              </a:spcBef>
+              <a:buFont typeface="Arial" panose="020B0604020202020204" pitchFamily="34" charset="0"/>
+              <a:buChar char="•"/>
+            </a:pPr>
+            <a:r>
+              <a:rPr lang="en-US" altLang="it-IT" sz="2200" dirty="0">
+                <a:solidFill>
+                  <a:srgbClr val="000000"/>
+                </a:solidFill>
+                <a:latin typeface="Garamond" panose="02020404030301010803" pitchFamily="18" charset="0"/>
+              </a:rPr>
+              <a:t>Reddit</a:t>
+            </a:r>
+          </a:p>
+          <a:p>
+            <a:pPr marL="342900" indent="-342900" eaLnBrk="1" hangingPunct="1">
+              <a:spcBef>
+                <a:spcPct val="20000"/>
+              </a:spcBef>
+              <a:buFont typeface="Arial" panose="020B0604020202020204" pitchFamily="34" charset="0"/>
+              <a:buChar char="•"/>
+            </a:pPr>
+            <a:r>
+              <a:rPr lang="en-US" altLang="it-IT" sz="2200" dirty="0">
+                <a:solidFill>
+                  <a:srgbClr val="000000"/>
+                </a:solidFill>
+                <a:latin typeface="Garamond" panose="02020404030301010803" pitchFamily="18" charset="0"/>
+              </a:rPr>
+              <a:t>GitHub</a:t>
+            </a:r>
+          </a:p>
+          <a:p>
+            <a:pPr marL="342900" indent="-342900" eaLnBrk="1" hangingPunct="1">
+              <a:spcBef>
+                <a:spcPct val="20000"/>
+              </a:spcBef>
+              <a:buFont typeface="Arial" panose="020B0604020202020204" pitchFamily="34" charset="0"/>
+              <a:buChar char="•"/>
+            </a:pPr>
+            <a:r>
+              <a:rPr lang="en-US" altLang="it-IT" sz="2200" dirty="0">
+                <a:solidFill>
+                  <a:srgbClr val="000000"/>
+                </a:solidFill>
+                <a:latin typeface="Garamond" panose="02020404030301010803" pitchFamily="18" charset="0"/>
+              </a:rPr>
+              <a:t>Paper’s references</a:t>
             </a:r>
           </a:p>
           <a:p>
@@ -12426,6 +12520,28 @@
                 <a:spcPct val="20000"/>
               </a:spcBef>
             </a:pPr>
+            <a:endParaRPr lang="en-US" altLang="it-IT" sz="2200" b="1" dirty="0">
+              <a:solidFill>
+                <a:srgbClr val="000000"/>
+              </a:solidFill>
+              <a:latin typeface="Garamond" panose="02020404030301010803" pitchFamily="18" charset="0"/>
+            </a:endParaRPr>
+          </a:p>
+          <a:p>
+            <a:pPr eaLnBrk="1" hangingPunct="1">
+              <a:spcBef>
+                <a:spcPct val="20000"/>
+              </a:spcBef>
+            </a:pPr>
+            <a:r>
+              <a:rPr lang="en-US" altLang="it-IT" sz="2200" b="1" dirty="0">
+                <a:solidFill>
+                  <a:srgbClr val="000000"/>
+                </a:solidFill>
+                <a:latin typeface="Garamond" panose="02020404030301010803" pitchFamily="18" charset="0"/>
+              </a:rPr>
+              <a:t>2) For each paper</a:t>
+            </a:r>
             <a:r>
               <a:rPr lang="en-US" altLang="it-IT" sz="2200" dirty="0">
                 <a:solidFill>
@@ -12433,7 +12549,43 @@
                 </a:solidFill>
                 <a:latin typeface="Garamond" panose="02020404030301010803" pitchFamily="18" charset="0"/>
               </a:rPr>
-              <a:t>Mixing X and Y will work?</a:t>
+              <a:t>:</a:t>
+            </a:r>
+          </a:p>
+          <a:p>
+            <a:pPr marL="342900" indent="-342900" eaLnBrk="1" hangingPunct="1">
+              <a:spcBef>
+                <a:spcPct val="20000"/>
+              </a:spcBef>
+              <a:buFont typeface="Arial" panose="020B0604020202020204" pitchFamily="34" charset="0"/>
+              <a:buChar char="•"/>
+            </a:pPr>
+            <a:r>
+              <a:rPr lang="en-US" altLang="it-IT" sz="2200" dirty="0">
+                <a:solidFill>
+                  <a:srgbClr val="000000"/>
+                </a:solidFill>
+                <a:latin typeface="Garamond" panose="02020404030301010803" pitchFamily="18" charset="0"/>
+              </a:rPr>
+              <a:t>What we find useful for our problem?</a:t>
+            </a:r>
+          </a:p>
+          <a:p>
+            <a:pPr marL="342900" indent="-342900" eaLnBrk="1" hangingPunct="1">
+              <a:spcBef>
+                <a:spcPct val="20000"/>
+              </a:spcBef>
+              <a:buFont typeface="Arial" panose="020B0604020202020204" pitchFamily="34" charset="0"/>
+              <a:buChar char="•"/>
+            </a:pPr>
+            <a:r>
+              <a:rPr lang="en-US" altLang="it-IT" sz="2200" dirty="0">
+                <a:solidFill>
+                  <a:srgbClr val="000000"/>
+                </a:solidFill>
+                <a:latin typeface="Garamond" panose="02020404030301010803" pitchFamily="18" charset="0"/>
+              </a:rPr>
+              <a:t>Which references we want to follow?</a:t>
             </a:r>
           </a:p>
           <a:p>
@@ -12448,140 +12600,6 @@
               </a:solidFill>
               <a:latin typeface="Garamond" panose="02020404030301010803" pitchFamily="18" charset="0"/>
             </a:endParaRPr>
-          </a:p>
-          <a:p>
-            <a:pPr eaLnBrk="1" hangingPunct="1">
-              <a:spcBef>
-                <a:spcPct val="20000"/>
-              </a:spcBef>
-            </a:pPr>
-            <a:endParaRPr lang="en-US" altLang="it-IT" sz="2200" dirty="0">
-              <a:solidFill>
-                <a:srgbClr val="000000"/>
-              </a:solidFill>
-              <a:latin typeface="Garamond" panose="02020404030301010803" pitchFamily="18" charset="0"/>
-            </a:endParaRPr>
-          </a:p>
-          <a:p>
-            <a:pPr eaLnBrk="1" hangingPunct="1">
-              <a:spcBef>
-                <a:spcPct val="20000"/>
-              </a:spcBef>
-            </a:pPr>
-            <a:endParaRPr lang="en-US" altLang="it-IT" sz="2200" dirty="0">
-              <a:solidFill>
-                <a:srgbClr val="000000"/>
-              </a:solidFill>
-              <a:latin typeface="Garamond" panose="02020404030301010803" pitchFamily="18" charset="0"/>
-            </a:endParaRPr>
-          </a:p>
-          <a:p>
-            <a:pPr eaLnBrk="1" hangingPunct="1">
-              <a:spcBef>
-                <a:spcPct val="20000"/>
-              </a:spcBef>
-            </a:pPr>
-            <a:r>
-              <a:rPr lang="en-US" altLang="it-IT" sz="2200" b="1" dirty="0">
-                <a:solidFill>
-                  <a:srgbClr val="000000"/>
-                </a:solidFill>
-                <a:latin typeface="Garamond" panose="02020404030301010803" pitchFamily="18" charset="0"/>
-              </a:rPr>
-              <a:t>4 ) Debugging</a:t>
-            </a:r>
-            <a:r>
-              <a:rPr lang="en-US" altLang="it-IT" sz="2200" dirty="0">
-                <a:solidFill>
-                  <a:srgbClr val="000000"/>
-                </a:solidFill>
-                <a:latin typeface="Garamond" panose="02020404030301010803" pitchFamily="18" charset="0"/>
-              </a:rPr>
-              <a:t>:</a:t>
-            </a:r>
-          </a:p>
-          <a:p>
-            <a:pPr marL="342900" indent="-342900" eaLnBrk="1" hangingPunct="1">
-              <a:spcBef>
-                <a:spcPct val="20000"/>
-              </a:spcBef>
-              <a:buFont typeface="Arial" panose="020B0604020202020204" pitchFamily="34" charset="0"/>
-              <a:buChar char="•"/>
-            </a:pPr>
-            <a:r>
-              <a:rPr lang="en-US" altLang="it-IT" sz="2200" dirty="0">
-                <a:solidFill>
-                  <a:srgbClr val="000000"/>
-                </a:solidFill>
-                <a:latin typeface="Garamond" panose="02020404030301010803" pitchFamily="18" charset="0"/>
-              </a:rPr>
-              <a:t>Bias vs Variance</a:t>
-            </a:r>
-          </a:p>
-          <a:p>
-            <a:pPr marL="342900" indent="-342900" eaLnBrk="1" hangingPunct="1">
-              <a:spcBef>
-                <a:spcPct val="20000"/>
-              </a:spcBef>
-              <a:buFont typeface="Arial" panose="020B0604020202020204" pitchFamily="34" charset="0"/>
-              <a:buChar char="•"/>
-            </a:pPr>
-            <a:r>
-              <a:rPr lang="en-US" altLang="it-IT" sz="2200" dirty="0">
-                <a:solidFill>
-                  <a:srgbClr val="000000"/>
-                </a:solidFill>
-                <a:latin typeface="Garamond" panose="02020404030301010803" pitchFamily="18" charset="0"/>
-              </a:rPr>
-              <a:t>Why didn’t work?</a:t>
-            </a:r>
-          </a:p>
-          <a:p>
-            <a:pPr marL="1085850" lvl="1" indent="-342900" eaLnBrk="1" hangingPunct="1">
-              <a:spcBef>
-                <a:spcPct val="20000"/>
-              </a:spcBef>
-              <a:buFont typeface="Courier New" panose="02070309020205020404" pitchFamily="49" charset="0"/>
-              <a:buChar char="o"/>
-            </a:pPr>
-            <a:r>
-              <a:rPr lang="en-US" altLang="it-IT" sz="2200" dirty="0">
-                <a:solidFill>
-                  <a:srgbClr val="000000"/>
-                </a:solidFill>
-                <a:latin typeface="Garamond" panose="02020404030301010803" pitchFamily="18" charset="0"/>
-              </a:rPr>
-              <a:t>When explaining we discovered other things to try</a:t>
-            </a:r>
-          </a:p>
-          <a:p>
-            <a:pPr eaLnBrk="1" hangingPunct="1">
-              <a:spcBef>
-                <a:spcPct val="20000"/>
-              </a:spcBef>
-            </a:pPr>
-            <a:endParaRPr lang="en-US" altLang="it-IT" sz="2200" dirty="0">
-              <a:solidFill>
-                <a:srgbClr val="000000"/>
-              </a:solidFill>
-              <a:latin typeface="Garamond" panose="02020404030301010803" pitchFamily="18" charset="0"/>
-            </a:endParaRPr>
-          </a:p>
-          <a:p>
-            <a:pPr eaLnBrk="1" hangingPunct="1">
-              <a:spcBef>
-                <a:spcPct val="20000"/>
-              </a:spcBef>
-            </a:pPr>
-            <a:r>
-              <a:rPr lang="en-US" altLang="it-IT" sz="2200" dirty="0">
-                <a:solidFill>
-                  <a:srgbClr val="000000"/>
-                </a:solidFill>
-                <a:latin typeface="Garamond" panose="02020404030301010803" pitchFamily="18" charset="0"/>
-              </a:rPr>
-              <a:t> </a:t>
-            </a:r>
           </a:p>
           <a:p>
             <a:pPr marL="342900" indent="-342900" eaLnBrk="1" hangingPunct="1">
@@ -12630,118 +12648,266 @@
           </a:p>
         </p:txBody>
       </p:sp>
-      <p:pic>
-        <p:nvPicPr>
-          <p:cNvPr id="1026" name="Picture 2" descr="Two puzzle pieces | Free Icon">
+      <p:cxnSp>
+        <p:nvCxnSpPr>
+          <p:cNvPr id="27" name="Connettore diritto 26">
             <a:extLst>
               <a:ext uri="{FF2B5EF4-FFF2-40B4-BE49-F238E27FC236}">
-                <a16:creationId xmlns:a16="http://schemas.microsoft.com/office/drawing/2014/main" id="{7C088BFB-4250-4ADF-BD18-838E0EC7C5CE}"/>
+                <a16:creationId xmlns:a16="http://schemas.microsoft.com/office/drawing/2014/main" id="{B0F260F5-F52D-4DD0-8890-EF9D873C4802}"/>
               </a:ext>
             </a:extLst>
           </p:cNvPr>
-          <p:cNvPicPr>
-            <a:picLocks noChangeAspect="1" noChangeArrowheads="1"/>
-          </p:cNvPicPr>
+          <p:cNvCxnSpPr>
+            <a:cxnSpLocks/>
+          </p:cNvCxnSpPr>
           <p:nvPr/>
-        </p:nvPicPr>
-        <p:blipFill rotWithShape="1">
-          <a:blip r:embed="rId2">
-            <a:extLst>
-              <a:ext uri="{28A0092B-C50C-407E-A947-70E740481C1C}">
-                <a14:useLocalDpi xmlns:a14="http://schemas.microsoft.com/office/drawing/2010/main" val="0"/>
-              </a:ext>
-            </a:extLst>
-          </a:blip>
-          <a:srcRect t="26139" b="28094"/>
-          <a:stretch/>
-        </p:blipFill>
-        <p:spPr bwMode="auto">
-          <a:xfrm>
-            <a:off x="3747735" y="3253509"/>
-            <a:ext cx="2982118" cy="1364820"/>
-          </a:xfrm>
-          <a:prstGeom prst="rect">
+        </p:nvCxnSpPr>
+        <p:spPr>
+          <a:xfrm flipV="1">
+            <a:off x="5080000" y="3814619"/>
+            <a:ext cx="0" cy="1625599"/>
+          </a:xfrm>
+          <a:prstGeom prst="line">
             <a:avLst/>
           </a:prstGeom>
-          <a:noFill/>
-          <a:extLst>
-            <a:ext uri="{909E8E84-426E-40DD-AFC4-6F175D3DCCD1}">
-              <a14:hiddenFill xmlns:a14="http://schemas.microsoft.com/office/drawing/2010/main">
-                <a:solidFill>
-                  <a:srgbClr val="FFFFFF"/>
-                </a:solidFill>
-              </a14:hiddenFill>
-            </a:ext>
-          </a:extLst>
-        </p:spPr>
-      </p:pic>
-      <p:sp>
-        <p:nvSpPr>
-          <p:cNvPr id="4" name="CasellaDiTesto 3">
+          <a:ln w="57150"/>
+        </p:spPr>
+        <p:style>
+          <a:lnRef idx="2">
+            <a:schemeClr val="dk1"/>
+          </a:lnRef>
+          <a:fillRef idx="0">
+            <a:schemeClr val="dk1"/>
+          </a:fillRef>
+          <a:effectRef idx="1">
+            <a:schemeClr val="dk1"/>
+          </a:effectRef>
+          <a:fontRef idx="minor">
+            <a:schemeClr val="tx1"/>
+          </a:fontRef>
+        </p:style>
+      </p:cxnSp>
+      <p:cxnSp>
+        <p:nvCxnSpPr>
+          <p:cNvPr id="29" name="Connettore diritto 28">
             <a:extLst>
               <a:ext uri="{FF2B5EF4-FFF2-40B4-BE49-F238E27FC236}">
-                <a16:creationId xmlns:a16="http://schemas.microsoft.com/office/drawing/2014/main" id="{E4AAD0F5-CE75-4940-A8D0-D90C44671B15}"/>
+                <a16:creationId xmlns:a16="http://schemas.microsoft.com/office/drawing/2014/main" id="{FCF7879F-803F-475D-872E-F3543533547B}"/>
               </a:ext>
             </a:extLst>
           </p:cNvPr>
-          <p:cNvSpPr txBox="1"/>
+          <p:cNvCxnSpPr/>
           <p:nvPr/>
-        </p:nvSpPr>
+        </p:nvCxnSpPr>
         <p:spPr>
-          <a:xfrm>
-            <a:off x="3842327" y="2979102"/>
-            <a:ext cx="1468582" cy="369332"/>
-          </a:xfrm>
-          <a:prstGeom prst="rect">
+          <a:xfrm flipH="1">
+            <a:off x="4645891" y="5440218"/>
+            <a:ext cx="434109" cy="0"/>
+          </a:xfrm>
+          <a:prstGeom prst="line">
             <a:avLst/>
           </a:prstGeom>
-          <a:noFill/>
-        </p:spPr>
-        <p:txBody>
-          <a:bodyPr wrap="square" rtlCol="0">
-            <a:spAutoFit/>
-          </a:bodyPr>
+          <a:ln w="57150"/>
+        </p:spPr>
+        <p:style>
+          <a:lnRef idx="2">
+            <a:schemeClr val="dk1"/>
+          </a:lnRef>
+          <a:fillRef idx="0">
+            <a:schemeClr val="dk1"/>
+          </a:fillRef>
+          <a:effectRef idx="1">
+            <a:schemeClr val="dk1"/>
+          </a:effectRef>
+          <a:fontRef idx="minor">
+            <a:schemeClr val="tx1"/>
+          </a:fontRef>
+        </p:style>
+      </p:cxnSp>
+      <p:cxnSp>
+        <p:nvCxnSpPr>
+          <p:cNvPr id="31" name="Connettore 2 30">
+            <a:extLst>
+              <a:ext uri="{FF2B5EF4-FFF2-40B4-BE49-F238E27FC236}">
+                <a16:creationId xmlns:a16="http://schemas.microsoft.com/office/drawing/2014/main" id="{391DB72E-687B-4D0B-B74B-65C80262BE50}"/>
+              </a:ext>
+            </a:extLst>
+          </p:cNvPr>
+          <p:cNvCxnSpPr>
+            <a:cxnSpLocks/>
+          </p:cNvCxnSpPr>
+          <p:nvPr/>
+        </p:nvCxnSpPr>
+        <p:spPr>
+          <a:xfrm flipH="1">
+            <a:off x="2514519" y="3814618"/>
+            <a:ext cx="2565481" cy="0"/>
+          </a:xfrm>
+          <a:prstGeom prst="straightConnector1">
+            <a:avLst/>
+          </a:prstGeom>
+          <a:ln w="57150">
+            <a:tailEnd type="triangle"/>
+          </a:ln>
+        </p:spPr>
+        <p:style>
+          <a:lnRef idx="2">
+            <a:schemeClr val="dk1"/>
+          </a:lnRef>
+          <a:fillRef idx="0">
+            <a:schemeClr val="dk1"/>
+          </a:fillRef>
+          <a:effectRef idx="1">
+            <a:schemeClr val="dk1"/>
+          </a:effectRef>
+          <a:fontRef idx="minor">
+            <a:schemeClr val="tx1"/>
+          </a:fontRef>
+        </p:style>
+      </p:cxnSp>
+      <p:cxnSp>
+        <p:nvCxnSpPr>
+          <p:cNvPr id="38" name="Connettore 2 37">
+            <a:extLst>
+              <a:ext uri="{FF2B5EF4-FFF2-40B4-BE49-F238E27FC236}">
+                <a16:creationId xmlns:a16="http://schemas.microsoft.com/office/drawing/2014/main" id="{CEE1484F-3EA3-43CF-BCBC-9194988DDF2D}"/>
+              </a:ext>
+            </a:extLst>
+          </p:cNvPr>
+          <p:cNvCxnSpPr>
+            <a:cxnSpLocks/>
+          </p:cNvCxnSpPr>
+          <p:nvPr/>
+        </p:nvCxnSpPr>
+        <p:spPr>
+          <a:xfrm>
+            <a:off x="4729018" y="5006109"/>
+            <a:ext cx="1191491" cy="0"/>
+          </a:xfrm>
+          <a:prstGeom prst="straightConnector1">
+            <a:avLst/>
+          </a:prstGeom>
+          <a:ln w="57150">
+            <a:tailEnd type="triangle"/>
+          </a:ln>
+        </p:spPr>
+        <p:style>
+          <a:lnRef idx="2">
+            <a:schemeClr val="dk1"/>
+          </a:lnRef>
+          <a:fillRef idx="0">
+            <a:schemeClr val="dk1"/>
+          </a:fillRef>
+          <a:effectRef idx="1">
+            <a:schemeClr val="dk1"/>
+          </a:effectRef>
+          <a:fontRef idx="minor">
+            <a:schemeClr val="tx1"/>
+          </a:fontRef>
+        </p:style>
+      </p:cxnSp>
+      <p:sp>
+        <p:nvSpPr>
+          <p:cNvPr id="40" name="Scorrimento verticale 39">
+            <a:extLst>
+              <a:ext uri="{FF2B5EF4-FFF2-40B4-BE49-F238E27FC236}">
+                <a16:creationId xmlns:a16="http://schemas.microsoft.com/office/drawing/2014/main" id="{2411E49C-415B-4F75-BFA0-7BFC2C1BD8C4}"/>
+              </a:ext>
+            </a:extLst>
+          </p:cNvPr>
+          <p:cNvSpPr/>
+          <p:nvPr/>
+        </p:nvSpPr>
+        <p:spPr>
+          <a:xfrm>
+            <a:off x="5717309" y="3680460"/>
+            <a:ext cx="2096655" cy="2574621"/>
+          </a:xfrm>
+          <a:prstGeom prst="verticalScroll">
+            <a:avLst/>
+          </a:prstGeom>
+        </p:spPr>
+        <p:style>
+          <a:lnRef idx="2">
+            <a:schemeClr val="dk1"/>
+          </a:lnRef>
+          <a:fillRef idx="1">
+            <a:schemeClr val="lt1"/>
+          </a:fillRef>
+          <a:effectRef idx="0">
+            <a:schemeClr val="dk1"/>
+          </a:effectRef>
+          <a:fontRef idx="minor">
+            <a:schemeClr val="dk1"/>
+          </a:fontRef>
+        </p:style>
+        <p:txBody>
+          <a:bodyPr rtlCol="0" anchor="ctr"/>
           <a:lstStyle/>
           <a:p>
+            <a:pPr marL="285750" indent="-285750">
+              <a:buFont typeface="Arial" panose="020B0604020202020204" pitchFamily="34" charset="0"/>
+              <a:buChar char="•"/>
+            </a:pPr>
             <a:r>
               <a:rPr lang="it-IT" dirty="0"/>
               <a:t>Transformer</a:t>
             </a:r>
           </a:p>
-        </p:txBody>
-      </p:sp>
-      <p:sp>
-        <p:nvSpPr>
-          <p:cNvPr id="16" name="CasellaDiTesto 15">
-            <a:extLst>
-              <a:ext uri="{FF2B5EF4-FFF2-40B4-BE49-F238E27FC236}">
-                <a16:creationId xmlns:a16="http://schemas.microsoft.com/office/drawing/2014/main" id="{74F5B66A-2790-4DD8-939A-9B33FD2EE055}"/>
-              </a:ext>
-            </a:extLst>
-          </p:cNvPr>
-          <p:cNvSpPr txBox="1"/>
-          <p:nvPr/>
-        </p:nvSpPr>
-        <p:spPr>
-          <a:xfrm>
-            <a:off x="5286090" y="2985997"/>
-            <a:ext cx="1468582" cy="369332"/>
-          </a:xfrm>
-          <a:prstGeom prst="rect">
-            <a:avLst/>
-          </a:prstGeom>
-          <a:noFill/>
-        </p:spPr>
-        <p:txBody>
-          <a:bodyPr wrap="square" rtlCol="0">
-            <a:spAutoFit/>
-          </a:bodyPr>
-          <a:lstStyle/>
-          <a:p>
+          <a:p>
+            <a:pPr marL="285750" indent="-285750">
+              <a:buFont typeface="Arial" panose="020B0604020202020204" pitchFamily="34" charset="0"/>
+              <a:buChar char="•"/>
+            </a:pPr>
             <a:r>
               <a:rPr lang="it-IT" dirty="0" err="1"/>
               <a:t>Attention</a:t>
             </a:r>
+            <a:endParaRPr lang="it-IT" dirty="0"/>
+          </a:p>
+          <a:p>
+            <a:pPr marL="285750" indent="-285750">
+              <a:buFont typeface="Arial" panose="020B0604020202020204" pitchFamily="34" charset="0"/>
+              <a:buChar char="•"/>
+            </a:pPr>
+            <a:r>
+              <a:rPr lang="it-IT" dirty="0"/>
+              <a:t>40 MFCC</a:t>
+            </a:r>
+          </a:p>
+          <a:p>
+            <a:pPr marL="285750" indent="-285750">
+              <a:buFont typeface="Arial" panose="020B0604020202020204" pitchFamily="34" charset="0"/>
+              <a:buChar char="•"/>
+            </a:pPr>
+            <a:r>
+              <a:rPr lang="it-IT" dirty="0" err="1"/>
+              <a:t>SincConv</a:t>
+            </a:r>
+            <a:endParaRPr lang="it-IT" dirty="0"/>
+          </a:p>
+          <a:p>
+            <a:pPr marL="285750" indent="-285750">
+              <a:buFont typeface="Arial" panose="020B0604020202020204" pitchFamily="34" charset="0"/>
+              <a:buChar char="•"/>
+            </a:pPr>
+            <a:r>
+              <a:rPr lang="it-IT" dirty="0"/>
+              <a:t>…</a:t>
+            </a:r>
+          </a:p>
+          <a:p>
+            <a:pPr marL="285750" indent="-285750">
+              <a:buFont typeface="Arial" panose="020B0604020202020204" pitchFamily="34" charset="0"/>
+              <a:buChar char="•"/>
+            </a:pPr>
+            <a:endParaRPr lang="it-IT" dirty="0"/>
+          </a:p>
+          <a:p>
+            <a:pPr marL="285750" indent="-285750" algn="just">
+              <a:buFont typeface="Arial" panose="020B0604020202020204" pitchFamily="34" charset="0"/>
+              <a:buChar char="•"/>
+            </a:pPr>
             <a:endParaRPr lang="it-IT" dirty="0"/>
           </a:p>
         </p:txBody>
@@ -12749,7 +12915,7 @@
     </p:spTree>
     <p:extLst>
       <p:ext uri="{BB962C8B-B14F-4D97-AF65-F5344CB8AC3E}">
-        <p14:creationId xmlns:p14="http://schemas.microsoft.com/office/powerpoint/2010/main" val="3152893802"/>
+        <p14:creationId xmlns:p14="http://schemas.microsoft.com/office/powerpoint/2010/main" val="3863927342"/>
       </p:ext>
     </p:extLst>
   </p:cSld>
@@ -12939,7 +13105,7 @@
                 </a:solidFill>
                 <a:latin typeface="Tw Cen MT" panose="020B0602020104020603" pitchFamily="34" charset="0"/>
               </a:rPr>
-              <a:t>What we tried</a:t>
+              <a:t>How we have tackled it</a:t>
             </a:r>
           </a:p>
         </p:txBody>
@@ -12959,7 +13125,7 @@
         <p:spPr>
           <a:xfrm>
             <a:off x="0" y="6408477"/>
-            <a:ext cx="3054875" cy="461665"/>
+            <a:ext cx="2997167" cy="461665"/>
           </a:xfrm>
           <a:prstGeom prst="rect">
             <a:avLst/>
@@ -12983,7 +13149,7 @@
                 </a:solidFill>
                 <a:latin typeface="Garamond" panose="02020404030301010803" pitchFamily="18" charset="0"/>
               </a:rPr>
-              <a:t>Ivancich S. – Masiero L.</a:t>
+              <a:t>Ivancich S. - Masiero L.</a:t>
             </a:r>
           </a:p>
         </p:txBody>
@@ -13002,7 +13168,7 @@
         </p:nvSpPr>
         <p:spPr>
           <a:xfrm>
-            <a:off x="8815064" y="6420771"/>
+            <a:off x="8815064" y="6408477"/>
             <a:ext cx="328936" cy="461665"/>
           </a:xfrm>
           <a:prstGeom prst="rect">
@@ -13027,8 +13193,14 @@
                 </a:solidFill>
                 <a:latin typeface="Garamond" panose="02020404030301010803" pitchFamily="18" charset="0"/>
               </a:rPr>
-              <a:t>5</a:t>
-            </a:r>
+              <a:t>4</a:t>
+            </a:r>
+            <a:endParaRPr lang="en-US" altLang="it-IT" sz="1800" dirty="0">
+              <a:solidFill>
+                <a:srgbClr val="000000"/>
+              </a:solidFill>
+              <a:latin typeface="Garamond" panose="02020404030301010803" pitchFamily="18" charset="0"/>
+            </a:endParaRPr>
           </a:p>
         </p:txBody>
       </p:sp>
@@ -13092,7 +13264,7 @@
         </p:nvSpPr>
         <p:spPr bwMode="auto">
           <a:xfrm>
-            <a:off x="272255" y="1181692"/>
+            <a:off x="137318" y="1181692"/>
             <a:ext cx="8599487" cy="5073389"/>
           </a:xfrm>
           <a:prstGeom prst="rect">
@@ -13237,7 +13409,7 @@
                 </a:solidFill>
                 <a:latin typeface="Garamond" panose="02020404030301010803" pitchFamily="18" charset="0"/>
               </a:rPr>
-              <a:t>Data Preprocessing techniques</a:t>
+              <a:t>3) Try to mix</a:t>
             </a:r>
             <a:r>
               <a:rPr lang="en-US" altLang="it-IT" sz="2200" dirty="0">
@@ -13246,11 +13418,27 @@
                 </a:solidFill>
                 <a:latin typeface="Garamond" panose="02020404030301010803" pitchFamily="18" charset="0"/>
               </a:rPr>
-              <a:t>:</a:t>
-            </a:r>
-          </a:p>
-          <a:p>
-            <a:pPr marL="285750" indent="-285750" eaLnBrk="1" hangingPunct="1">
+              <a:t> from things written down</a:t>
+            </a:r>
+          </a:p>
+          <a:p>
+            <a:pPr eaLnBrk="1" hangingPunct="1">
+              <a:spcBef>
+                <a:spcPct val="20000"/>
+              </a:spcBef>
+            </a:pPr>
+            <a:r>
+              <a:rPr lang="en-US" altLang="it-IT" sz="2200" dirty="0">
+                <a:solidFill>
+                  <a:srgbClr val="000000"/>
+                </a:solidFill>
+                <a:latin typeface="Garamond" panose="02020404030301010803" pitchFamily="18" charset="0"/>
+              </a:rPr>
+              <a:t>Example:</a:t>
+            </a:r>
+          </a:p>
+          <a:p>
+            <a:pPr marL="342900" indent="-342900" eaLnBrk="1" hangingPunct="1">
               <a:spcBef>
                 <a:spcPct val="20000"/>
               </a:spcBef>
@@ -13264,36 +13452,11 @@
                 </a:solidFill>
                 <a:latin typeface="Garamond" panose="02020404030301010803" pitchFamily="18" charset="0"/>
               </a:rPr>
-              <a:t>….</a:t>
-            </a:r>
-          </a:p>
-          <a:p>
-            <a:pPr eaLnBrk="1" hangingPunct="1">
-              <a:spcBef>
-                <a:spcPct val="20000"/>
-              </a:spcBef>
-            </a:pPr>
-            <a:r>
-              <a:rPr lang="en-US" altLang="it-IT" sz="2200" b="1" dirty="0">
-                <a:solidFill>
-                  <a:srgbClr val="000000"/>
-                </a:solidFill>
-                <a:latin typeface="Garamond" panose="02020404030301010803" pitchFamily="18" charset="0"/>
-              </a:rPr>
-              <a:t>Learning Architectures</a:t>
-            </a:r>
-            <a:r>
-              <a:rPr lang="en-US" altLang="it-IT" sz="2200" dirty="0">
-                <a:solidFill>
-                  <a:srgbClr val="000000"/>
-                </a:solidFill>
-                <a:latin typeface="Garamond" panose="02020404030301010803" pitchFamily="18" charset="0"/>
-              </a:rPr>
-              <a:t>:</a:t>
-            </a:r>
-          </a:p>
-          <a:p>
-            <a:pPr marL="285750" indent="-285750" eaLnBrk="1" hangingPunct="1">
+              <a:t>Paper X says that Transformer is better than RNN because …</a:t>
+            </a:r>
+          </a:p>
+          <a:p>
+            <a:pPr marL="342900" indent="-342900" eaLnBrk="1" hangingPunct="1">
               <a:spcBef>
                 <a:spcPct val="20000"/>
               </a:spcBef>
@@ -13307,7 +13470,7 @@
                 </a:solidFill>
                 <a:latin typeface="Garamond" panose="02020404030301010803" pitchFamily="18" charset="0"/>
               </a:rPr>
-              <a:t>…</a:t>
+              <a:t>Paper Y says that Attention Mechanism … is good for KWS ….</a:t>
             </a:r>
           </a:p>
           <a:p>
@@ -13323,23 +13486,8 @@
                 </a:solidFill>
                 <a:latin typeface="Garamond" panose="02020404030301010803" pitchFamily="18" charset="0"/>
               </a:rPr>
-              <a:t>…..</a:t>
-            </a:r>
-          </a:p>
-          <a:p>
-            <a:pPr marL="285750" indent="-285750" eaLnBrk="1" hangingPunct="1">
-              <a:spcBef>
-                <a:spcPct val="20000"/>
-              </a:spcBef>
-              <a:buFont typeface="Arial" panose="020B0604020202020204" pitchFamily="34" charset="0"/>
-              <a:buChar char="•"/>
-            </a:pPr>
-            <a:endParaRPr lang="en-US" altLang="it-IT" sz="1800" dirty="0">
-              <a:solidFill>
-                <a:srgbClr val="000000"/>
-              </a:solidFill>
-              <a:latin typeface="Garamond" panose="02020404030301010803" pitchFamily="18" charset="0"/>
-            </a:endParaRPr>
+              <a:t>Mixing X and Y will work?</a:t>
+            </a:r>
           </a:p>
           <a:p>
             <a:pPr eaLnBrk="1" hangingPunct="1">
@@ -13354,12 +13502,307 @@
               <a:latin typeface="Garamond" panose="02020404030301010803" pitchFamily="18" charset="0"/>
             </a:endParaRPr>
           </a:p>
+          <a:p>
+            <a:pPr eaLnBrk="1" hangingPunct="1">
+              <a:spcBef>
+                <a:spcPct val="20000"/>
+              </a:spcBef>
+            </a:pPr>
+            <a:endParaRPr lang="en-US" altLang="it-IT" sz="2200" dirty="0">
+              <a:solidFill>
+                <a:srgbClr val="000000"/>
+              </a:solidFill>
+              <a:latin typeface="Garamond" panose="02020404030301010803" pitchFamily="18" charset="0"/>
+            </a:endParaRPr>
+          </a:p>
+          <a:p>
+            <a:pPr eaLnBrk="1" hangingPunct="1">
+              <a:spcBef>
+                <a:spcPct val="20000"/>
+              </a:spcBef>
+            </a:pPr>
+            <a:endParaRPr lang="en-US" altLang="it-IT" sz="2200" dirty="0">
+              <a:solidFill>
+                <a:srgbClr val="000000"/>
+              </a:solidFill>
+              <a:latin typeface="Garamond" panose="02020404030301010803" pitchFamily="18" charset="0"/>
+            </a:endParaRPr>
+          </a:p>
+          <a:p>
+            <a:pPr eaLnBrk="1" hangingPunct="1">
+              <a:spcBef>
+                <a:spcPct val="20000"/>
+              </a:spcBef>
+            </a:pPr>
+            <a:r>
+              <a:rPr lang="en-US" altLang="it-IT" sz="2200" b="1" dirty="0">
+                <a:solidFill>
+                  <a:srgbClr val="000000"/>
+                </a:solidFill>
+                <a:latin typeface="Garamond" panose="02020404030301010803" pitchFamily="18" charset="0"/>
+              </a:rPr>
+              <a:t>4 ) Debugging</a:t>
+            </a:r>
+            <a:r>
+              <a:rPr lang="en-US" altLang="it-IT" sz="2200" dirty="0">
+                <a:solidFill>
+                  <a:srgbClr val="000000"/>
+                </a:solidFill>
+                <a:latin typeface="Garamond" panose="02020404030301010803" pitchFamily="18" charset="0"/>
+              </a:rPr>
+              <a:t>:</a:t>
+            </a:r>
+          </a:p>
+          <a:p>
+            <a:pPr marL="342900" indent="-342900" eaLnBrk="1" hangingPunct="1">
+              <a:spcBef>
+                <a:spcPct val="20000"/>
+              </a:spcBef>
+              <a:buFont typeface="Arial" panose="020B0604020202020204" pitchFamily="34" charset="0"/>
+              <a:buChar char="•"/>
+            </a:pPr>
+            <a:r>
+              <a:rPr lang="en-US" altLang="it-IT" sz="2200" dirty="0">
+                <a:solidFill>
+                  <a:srgbClr val="000000"/>
+                </a:solidFill>
+                <a:latin typeface="Garamond" panose="02020404030301010803" pitchFamily="18" charset="0"/>
+              </a:rPr>
+              <a:t>Bias vs Variance</a:t>
+            </a:r>
+          </a:p>
+          <a:p>
+            <a:pPr marL="342900" indent="-342900" eaLnBrk="1" hangingPunct="1">
+              <a:spcBef>
+                <a:spcPct val="20000"/>
+              </a:spcBef>
+              <a:buFont typeface="Arial" panose="020B0604020202020204" pitchFamily="34" charset="0"/>
+              <a:buChar char="•"/>
+            </a:pPr>
+            <a:r>
+              <a:rPr lang="en-US" altLang="it-IT" sz="2200" dirty="0">
+                <a:solidFill>
+                  <a:srgbClr val="000000"/>
+                </a:solidFill>
+                <a:latin typeface="Garamond" panose="02020404030301010803" pitchFamily="18" charset="0"/>
+              </a:rPr>
+              <a:t>Why didn’t work?</a:t>
+            </a:r>
+          </a:p>
+          <a:p>
+            <a:pPr marL="1085850" lvl="1" indent="-342900" eaLnBrk="1" hangingPunct="1">
+              <a:spcBef>
+                <a:spcPct val="20000"/>
+              </a:spcBef>
+              <a:buFont typeface="Courier New" panose="02070309020205020404" pitchFamily="49" charset="0"/>
+              <a:buChar char="o"/>
+            </a:pPr>
+            <a:r>
+              <a:rPr lang="en-US" altLang="it-IT" sz="2200" dirty="0">
+                <a:solidFill>
+                  <a:srgbClr val="000000"/>
+                </a:solidFill>
+                <a:latin typeface="Garamond" panose="02020404030301010803" pitchFamily="18" charset="0"/>
+              </a:rPr>
+              <a:t>When explaining we discovered other things to try</a:t>
+            </a:r>
+          </a:p>
+          <a:p>
+            <a:pPr eaLnBrk="1" hangingPunct="1">
+              <a:spcBef>
+                <a:spcPct val="20000"/>
+              </a:spcBef>
+            </a:pPr>
+            <a:endParaRPr lang="en-US" altLang="it-IT" sz="2200" dirty="0">
+              <a:solidFill>
+                <a:srgbClr val="000000"/>
+              </a:solidFill>
+              <a:latin typeface="Garamond" panose="02020404030301010803" pitchFamily="18" charset="0"/>
+            </a:endParaRPr>
+          </a:p>
+          <a:p>
+            <a:pPr eaLnBrk="1" hangingPunct="1">
+              <a:spcBef>
+                <a:spcPct val="20000"/>
+              </a:spcBef>
+            </a:pPr>
+            <a:r>
+              <a:rPr lang="en-US" altLang="it-IT" sz="2200" dirty="0">
+                <a:solidFill>
+                  <a:srgbClr val="000000"/>
+                </a:solidFill>
+                <a:latin typeface="Garamond" panose="02020404030301010803" pitchFamily="18" charset="0"/>
+              </a:rPr>
+              <a:t> </a:t>
+            </a:r>
+          </a:p>
+          <a:p>
+            <a:pPr marL="342900" indent="-342900" eaLnBrk="1" hangingPunct="1">
+              <a:spcBef>
+                <a:spcPct val="20000"/>
+              </a:spcBef>
+              <a:buFont typeface="Arial" panose="020B0604020202020204" pitchFamily="34" charset="0"/>
+              <a:buChar char="•"/>
+            </a:pPr>
+            <a:endParaRPr lang="en-US" altLang="it-IT" sz="2200" dirty="0">
+              <a:solidFill>
+                <a:srgbClr val="000000"/>
+              </a:solidFill>
+              <a:latin typeface="Garamond" panose="02020404030301010803" pitchFamily="18" charset="0"/>
+            </a:endParaRPr>
+          </a:p>
+          <a:p>
+            <a:pPr marL="342900" indent="-342900" eaLnBrk="1" hangingPunct="1">
+              <a:spcBef>
+                <a:spcPct val="20000"/>
+              </a:spcBef>
+              <a:buFont typeface="Arial" panose="020B0604020202020204" pitchFamily="34" charset="0"/>
+              <a:buChar char="•"/>
+            </a:pPr>
+            <a:endParaRPr lang="en-US" altLang="it-IT" sz="2200" dirty="0">
+              <a:solidFill>
+                <a:srgbClr val="000000"/>
+              </a:solidFill>
+              <a:latin typeface="Garamond" panose="02020404030301010803" pitchFamily="18" charset="0"/>
+            </a:endParaRPr>
+          </a:p>
+          <a:p>
+            <a:pPr marL="342900" indent="-342900" eaLnBrk="1" hangingPunct="1">
+              <a:spcBef>
+                <a:spcPct val="20000"/>
+              </a:spcBef>
+              <a:buFont typeface="Arial" panose="020B0604020202020204" pitchFamily="34" charset="0"/>
+              <a:buChar char="•"/>
+            </a:pPr>
+            <a:endParaRPr lang="en-US" altLang="it-IT" sz="2200" dirty="0">
+              <a:solidFill>
+                <a:srgbClr val="000000"/>
+              </a:solidFill>
+              <a:latin typeface="Garamond" panose="02020404030301010803" pitchFamily="18" charset="0"/>
+            </a:endParaRPr>
+          </a:p>
+        </p:txBody>
+      </p:sp>
+      <p:pic>
+        <p:nvPicPr>
+          <p:cNvPr id="1026" name="Picture 2" descr="Two puzzle pieces | Free Icon">
+            <a:extLst>
+              <a:ext uri="{FF2B5EF4-FFF2-40B4-BE49-F238E27FC236}">
+                <a16:creationId xmlns:a16="http://schemas.microsoft.com/office/drawing/2014/main" id="{7C088BFB-4250-4ADF-BD18-838E0EC7C5CE}"/>
+              </a:ext>
+            </a:extLst>
+          </p:cNvPr>
+          <p:cNvPicPr>
+            <a:picLocks noChangeAspect="1" noChangeArrowheads="1"/>
+          </p:cNvPicPr>
+          <p:nvPr/>
+        </p:nvPicPr>
+        <p:blipFill rotWithShape="1">
+          <a:blip r:embed="rId2">
+            <a:extLst>
+              <a:ext uri="{28A0092B-C50C-407E-A947-70E740481C1C}">
+                <a14:useLocalDpi xmlns:a14="http://schemas.microsoft.com/office/drawing/2010/main" val="0"/>
+              </a:ext>
+            </a:extLst>
+          </a:blip>
+          <a:srcRect t="26139" b="28094"/>
+          <a:stretch/>
+        </p:blipFill>
+        <p:spPr bwMode="auto">
+          <a:xfrm>
+            <a:off x="3747735" y="3253509"/>
+            <a:ext cx="2982118" cy="1364820"/>
+          </a:xfrm>
+          <a:prstGeom prst="rect">
+            <a:avLst/>
+          </a:prstGeom>
+          <a:noFill/>
+          <a:extLst>
+            <a:ext uri="{909E8E84-426E-40DD-AFC4-6F175D3DCCD1}">
+              <a14:hiddenFill xmlns:a14="http://schemas.microsoft.com/office/drawing/2010/main">
+                <a:solidFill>
+                  <a:srgbClr val="FFFFFF"/>
+                </a:solidFill>
+              </a14:hiddenFill>
+            </a:ext>
+          </a:extLst>
+        </p:spPr>
+      </p:pic>
+      <p:sp>
+        <p:nvSpPr>
+          <p:cNvPr id="4" name="CasellaDiTesto 3">
+            <a:extLst>
+              <a:ext uri="{FF2B5EF4-FFF2-40B4-BE49-F238E27FC236}">
+                <a16:creationId xmlns:a16="http://schemas.microsoft.com/office/drawing/2014/main" id="{E4AAD0F5-CE75-4940-A8D0-D90C44671B15}"/>
+              </a:ext>
+            </a:extLst>
+          </p:cNvPr>
+          <p:cNvSpPr txBox="1"/>
+          <p:nvPr/>
+        </p:nvSpPr>
+        <p:spPr>
+          <a:xfrm>
+            <a:off x="3842327" y="2979102"/>
+            <a:ext cx="1468582" cy="369332"/>
+          </a:xfrm>
+          <a:prstGeom prst="rect">
+            <a:avLst/>
+          </a:prstGeom>
+          <a:noFill/>
+        </p:spPr>
+        <p:txBody>
+          <a:bodyPr wrap="square" rtlCol="0">
+            <a:spAutoFit/>
+          </a:bodyPr>
+          <a:lstStyle/>
+          <a:p>
+            <a:r>
+              <a:rPr lang="it-IT" dirty="0"/>
+              <a:t>Transformer</a:t>
+            </a:r>
+          </a:p>
+        </p:txBody>
+      </p:sp>
+      <p:sp>
+        <p:nvSpPr>
+          <p:cNvPr id="16" name="CasellaDiTesto 15">
+            <a:extLst>
+              <a:ext uri="{FF2B5EF4-FFF2-40B4-BE49-F238E27FC236}">
+                <a16:creationId xmlns:a16="http://schemas.microsoft.com/office/drawing/2014/main" id="{74F5B66A-2790-4DD8-939A-9B33FD2EE055}"/>
+              </a:ext>
+            </a:extLst>
+          </p:cNvPr>
+          <p:cNvSpPr txBox="1"/>
+          <p:nvPr/>
+        </p:nvSpPr>
+        <p:spPr>
+          <a:xfrm>
+            <a:off x="5286090" y="2985997"/>
+            <a:ext cx="1468582" cy="369332"/>
+          </a:xfrm>
+          <a:prstGeom prst="rect">
+            <a:avLst/>
+          </a:prstGeom>
+          <a:noFill/>
+        </p:spPr>
+        <p:txBody>
+          <a:bodyPr wrap="square" rtlCol="0">
+            <a:spAutoFit/>
+          </a:bodyPr>
+          <a:lstStyle/>
+          <a:p>
+            <a:r>
+              <a:rPr lang="it-IT" dirty="0" err="1"/>
+              <a:t>Attention</a:t>
+            </a:r>
+            <a:endParaRPr lang="it-IT" dirty="0"/>
+          </a:p>
         </p:txBody>
       </p:sp>
     </p:spTree>
     <p:extLst>
       <p:ext uri="{BB962C8B-B14F-4D97-AF65-F5344CB8AC3E}">
-        <p14:creationId xmlns:p14="http://schemas.microsoft.com/office/powerpoint/2010/main" val="3841776771"/>
+        <p14:creationId xmlns:p14="http://schemas.microsoft.com/office/powerpoint/2010/main" val="3152893802"/>
       </p:ext>
     </p:extLst>
   </p:cSld>
@@ -13549,7 +13992,7 @@
                 </a:solidFill>
                 <a:latin typeface="Tw Cen MT" panose="020B0602020104020603" pitchFamily="34" charset="0"/>
               </a:rPr>
-              <a:t>Image Extraction</a:t>
+              <a:t>What we tried</a:t>
             </a:r>
           </a:p>
         </p:txBody>
@@ -13569,7 +14012,7 @@
         <p:spPr>
           <a:xfrm>
             <a:off x="0" y="6408477"/>
-            <a:ext cx="2175339" cy="461665"/>
+            <a:ext cx="3054875" cy="461665"/>
           </a:xfrm>
           <a:prstGeom prst="rect">
             <a:avLst/>
@@ -13593,7 +14036,7 @@
                 </a:solidFill>
                 <a:latin typeface="Garamond" panose="02020404030301010803" pitchFamily="18" charset="0"/>
               </a:rPr>
-              <a:t>Ivancich Stefano</a:t>
+              <a:t>Ivancich S. – Masiero L.</a:t>
             </a:r>
           </a:p>
         </p:txBody>
@@ -13612,7 +14055,7 @@
         </p:nvSpPr>
         <p:spPr>
           <a:xfrm>
-            <a:off x="8815064" y="6408477"/>
+            <a:off x="8815064" y="6420771"/>
             <a:ext cx="328936" cy="461665"/>
           </a:xfrm>
           <a:prstGeom prst="rect">
@@ -13639,12 +14082,6 @@
               </a:rPr>
               <a:t>5</a:t>
             </a:r>
-            <a:endParaRPr lang="en-US" altLang="it-IT" sz="1800" dirty="0">
-              <a:solidFill>
-                <a:srgbClr val="000000"/>
-              </a:solidFill>
-              <a:latin typeface="Garamond" panose="02020404030301010803" pitchFamily="18" charset="0"/>
-            </a:endParaRPr>
           </a:p>
         </p:txBody>
       </p:sp>
@@ -13687,7 +14124,7 @@
                 </a:solidFill>
                 <a:latin typeface="Garamond" panose="02020404030301010803" pitchFamily="18" charset="0"/>
               </a:rPr>
-              <a:t>15 July 2019</a:t>
+              <a:t>20 July 2020</a:t>
             </a:r>
           </a:p>
         </p:txBody>
@@ -13709,7 +14146,7 @@
         <p:spPr bwMode="auto">
           <a:xfrm>
             <a:off x="272255" y="1181692"/>
-            <a:ext cx="8599487" cy="1391387"/>
+            <a:ext cx="8599487" cy="5073389"/>
           </a:xfrm>
           <a:prstGeom prst="rect">
             <a:avLst/>
@@ -13853,7 +14290,7 @@
                 </a:solidFill>
                 <a:latin typeface="Garamond" panose="02020404030301010803" pitchFamily="18" charset="0"/>
               </a:rPr>
-              <a:t>MRI are 3D </a:t>
+              <a:t>Data Preprocessing techniques</a:t>
             </a:r>
             <a:r>
               <a:rPr lang="en-US" altLang="it-IT" sz="2200" dirty="0">
@@ -13862,8 +14299,33 @@
                 </a:solidFill>
                 <a:latin typeface="Garamond" panose="02020404030301010803" pitchFamily="18" charset="0"/>
               </a:rPr>
-              <a:t>so </a:t>
-            </a:r>
+              <a:t>:</a:t>
+            </a:r>
+          </a:p>
+          <a:p>
+            <a:pPr marL="285750" indent="-285750" eaLnBrk="1" hangingPunct="1">
+              <a:spcBef>
+                <a:spcPct val="20000"/>
+              </a:spcBef>
+              <a:buFont typeface="Arial" panose="020B0604020202020204" pitchFamily="34" charset="0"/>
+              <a:buChar char="•"/>
+            </a:pPr>
+            <a:r>
+              <a:rPr lang="en-US" altLang="it-IT" sz="2200" dirty="0">
+                <a:solidFill>
+                  <a:srgbClr val="000000"/>
+                </a:solidFill>
+                <a:latin typeface="Garamond" panose="02020404030301010803" pitchFamily="18" charset="0"/>
+              </a:rPr>
+              <a:t>….</a:t>
+            </a:r>
+          </a:p>
+          <a:p>
+            <a:pPr eaLnBrk="1" hangingPunct="1">
+              <a:spcBef>
+                <a:spcPct val="20000"/>
+              </a:spcBef>
+            </a:pPr>
             <a:r>
               <a:rPr lang="en-US" altLang="it-IT" sz="2200" b="1" dirty="0">
                 <a:solidFill>
@@ -13871,7 +14333,7 @@
                 </a:solidFill>
                 <a:latin typeface="Garamond" panose="02020404030301010803" pitchFamily="18" charset="0"/>
               </a:rPr>
-              <a:t>to make them 2D </a:t>
+              <a:t>Learning Architectures</a:t>
             </a:r>
             <a:r>
               <a:rPr lang="en-US" altLang="it-IT" sz="2200" dirty="0">
@@ -13880,17 +14342,17 @@
                 </a:solidFill>
                 <a:latin typeface="Garamond" panose="02020404030301010803" pitchFamily="18" charset="0"/>
               </a:rPr>
-              <a:t>we used the following</a:t>
-            </a:r>
-            <a:r>
-              <a:rPr lang="en-US" altLang="it-IT" sz="2200" b="1" dirty="0">
-                <a:solidFill>
-                  <a:srgbClr val="000000"/>
-                </a:solidFill>
-                <a:latin typeface="Garamond" panose="02020404030301010803" pitchFamily="18" charset="0"/>
-              </a:rPr>
-              <a:t> image extraction operation:</a:t>
-            </a:r>
+              <a:t>:</a:t>
+            </a:r>
+          </a:p>
+          <a:p>
+            <a:pPr marL="285750" indent="-285750" eaLnBrk="1" hangingPunct="1">
+              <a:spcBef>
+                <a:spcPct val="20000"/>
+              </a:spcBef>
+              <a:buFont typeface="Arial" panose="020B0604020202020204" pitchFamily="34" charset="0"/>
+              <a:buChar char="•"/>
+            </a:pPr>
             <a:r>
               <a:rPr lang="en-US" altLang="it-IT" sz="2200" dirty="0">
                 <a:solidFill>
@@ -13898,44 +14360,59 @@
                 </a:solidFill>
                 <a:latin typeface="Garamond" panose="02020404030301010803" pitchFamily="18" charset="0"/>
               </a:rPr>
-              <a:t> for a given voxel point, three patches of MRI 32x32 are extracted from the three planes, concatenated into a three-channel picture and resized in order to match the input size of the neural network.</a:t>
-            </a:r>
-          </a:p>
-        </p:txBody>
-      </p:sp>
-      <p:pic>
-        <p:nvPicPr>
-          <p:cNvPr id="5" name="Immagine 4" descr="Immagine che contiene mappa, testo&#10;&#10;Descrizione generata automaticamente">
-            <a:extLst>
-              <a:ext uri="{FF2B5EF4-FFF2-40B4-BE49-F238E27FC236}">
-                <a16:creationId xmlns:a16="http://schemas.microsoft.com/office/drawing/2014/main" id="{CA984F47-3541-485D-BA06-7F693C26D219}"/>
-              </a:ext>
-            </a:extLst>
-          </p:cNvPr>
-          <p:cNvPicPr>
-            <a:picLocks noChangeAspect="1"/>
-          </p:cNvPicPr>
-          <p:nvPr/>
-        </p:nvPicPr>
-        <p:blipFill rotWithShape="1">
-          <a:blip r:embed="rId2"/>
-          <a:srcRect t="2718" r="26187" b="79232"/>
-          <a:stretch/>
-        </p:blipFill>
-        <p:spPr>
-          <a:xfrm>
-            <a:off x="440189" y="2573079"/>
-            <a:ext cx="8374875" cy="3835398"/>
-          </a:xfrm>
-          <a:prstGeom prst="rect">
-            <a:avLst/>
-          </a:prstGeom>
-        </p:spPr>
-      </p:pic>
+              <a:t>…</a:t>
+            </a:r>
+          </a:p>
+          <a:p>
+            <a:pPr eaLnBrk="1" hangingPunct="1">
+              <a:spcBef>
+                <a:spcPct val="20000"/>
+              </a:spcBef>
+            </a:pPr>
+            <a:r>
+              <a:rPr lang="en-US" altLang="it-IT" sz="2200" dirty="0">
+                <a:solidFill>
+                  <a:srgbClr val="000000"/>
+                </a:solidFill>
+                <a:latin typeface="Garamond" panose="02020404030301010803" pitchFamily="18" charset="0"/>
+              </a:rPr>
+              <a:t>…..</a:t>
+            </a:r>
+          </a:p>
+          <a:p>
+            <a:pPr marL="285750" indent="-285750" eaLnBrk="1" hangingPunct="1">
+              <a:spcBef>
+                <a:spcPct val="20000"/>
+              </a:spcBef>
+              <a:buFont typeface="Arial" panose="020B0604020202020204" pitchFamily="34" charset="0"/>
+              <a:buChar char="•"/>
+            </a:pPr>
+            <a:endParaRPr lang="en-US" altLang="it-IT" sz="1800" dirty="0">
+              <a:solidFill>
+                <a:srgbClr val="000000"/>
+              </a:solidFill>
+              <a:latin typeface="Garamond" panose="02020404030301010803" pitchFamily="18" charset="0"/>
+            </a:endParaRPr>
+          </a:p>
+          <a:p>
+            <a:pPr eaLnBrk="1" hangingPunct="1">
+              <a:spcBef>
+                <a:spcPct val="20000"/>
+              </a:spcBef>
+            </a:pPr>
+            <a:endParaRPr lang="en-US" altLang="it-IT" sz="2200" dirty="0">
+              <a:solidFill>
+                <a:srgbClr val="000000"/>
+              </a:solidFill>
+              <a:latin typeface="Garamond" panose="02020404030301010803" pitchFamily="18" charset="0"/>
+            </a:endParaRPr>
+          </a:p>
+        </p:txBody>
+      </p:sp>
     </p:spTree>
     <p:extLst>
       <p:ext uri="{BB962C8B-B14F-4D97-AF65-F5344CB8AC3E}">
-        <p14:creationId xmlns:p14="http://schemas.microsoft.com/office/powerpoint/2010/main" val="1514234550"/>
+        <p14:creationId xmlns:p14="http://schemas.microsoft.com/office/powerpoint/2010/main" val="3841776771"/>
       </p:ext>
     </p:extLst>
   </p:cSld>
@@ -14125,7 +14602,7 @@
                 </a:solidFill>
                 <a:latin typeface="Tw Cen MT" panose="020B0602020104020603" pitchFamily="34" charset="0"/>
               </a:rPr>
-              <a:t>Example</a:t>
+              <a:t>Image Extraction</a:t>
             </a:r>
           </a:p>
         </p:txBody>
@@ -14213,7 +14690,7 @@
                 </a:solidFill>
                 <a:latin typeface="Garamond" panose="02020404030301010803" pitchFamily="18" charset="0"/>
               </a:rPr>
-              <a:t>6</a:t>
+              <a:t>5</a:t>
             </a:r>
             <a:endParaRPr lang="en-US" altLang="it-IT" sz="1800" dirty="0">
               <a:solidFill>
@@ -14285,7 +14762,7 @@
         <p:spPr bwMode="auto">
           <a:xfrm>
             <a:off x="272255" y="1181692"/>
-            <a:ext cx="8599487" cy="5073389"/>
+            <a:ext cx="8599487" cy="1391387"/>
           </a:xfrm>
           <a:prstGeom prst="rect">
             <a:avLst/>
@@ -14422,21 +14899,69 @@
                 <a:spcPct val="20000"/>
               </a:spcBef>
             </a:pPr>
-            <a:endParaRPr lang="en-US" altLang="it-IT" sz="2200" dirty="0">
-              <a:solidFill>
-                <a:srgbClr val="000000"/>
-              </a:solidFill>
-              <a:latin typeface="Garamond" panose="02020404030301010803" pitchFamily="18" charset="0"/>
-            </a:endParaRPr>
+            <a:r>
+              <a:rPr lang="en-US" altLang="it-IT" sz="2200" b="1" dirty="0">
+                <a:solidFill>
+                  <a:srgbClr val="000000"/>
+                </a:solidFill>
+                <a:latin typeface="Garamond" panose="02020404030301010803" pitchFamily="18" charset="0"/>
+              </a:rPr>
+              <a:t>MRI are 3D </a:t>
+            </a:r>
+            <a:r>
+              <a:rPr lang="en-US" altLang="it-IT" sz="2200" dirty="0">
+                <a:solidFill>
+                  <a:srgbClr val="000000"/>
+                </a:solidFill>
+                <a:latin typeface="Garamond" panose="02020404030301010803" pitchFamily="18" charset="0"/>
+              </a:rPr>
+              <a:t>so </a:t>
+            </a:r>
+            <a:r>
+              <a:rPr lang="en-US" altLang="it-IT" sz="2200" b="1" dirty="0">
+                <a:solidFill>
+                  <a:srgbClr val="000000"/>
+                </a:solidFill>
+                <a:latin typeface="Garamond" panose="02020404030301010803" pitchFamily="18" charset="0"/>
+              </a:rPr>
+              <a:t>to make them 2D </a:t>
+            </a:r>
+            <a:r>
+              <a:rPr lang="en-US" altLang="it-IT" sz="2200" dirty="0">
+                <a:solidFill>
+                  <a:srgbClr val="000000"/>
+                </a:solidFill>
+                <a:latin typeface="Garamond" panose="02020404030301010803" pitchFamily="18" charset="0"/>
+              </a:rPr>
+              <a:t>we used the following</a:t>
+            </a:r>
+            <a:r>
+              <a:rPr lang="en-US" altLang="it-IT" sz="2200" b="1" dirty="0">
+                <a:solidFill>
+                  <a:srgbClr val="000000"/>
+                </a:solidFill>
+                <a:latin typeface="Garamond" panose="02020404030301010803" pitchFamily="18" charset="0"/>
+              </a:rPr>
+              <a:t> image extraction operation:</a:t>
+            </a:r>
+            <a:r>
+              <a:rPr lang="en-US" altLang="it-IT" sz="2200" dirty="0">
+                <a:solidFill>
+                  <a:srgbClr val="000000"/>
+                </a:solidFill>
+                <a:latin typeface="Garamond" panose="02020404030301010803" pitchFamily="18" charset="0"/>
+              </a:rPr>
+              <a:t> for a given voxel point, three patches of MRI 32x32 are extracted from the three planes, concatenated into a three-channel picture and resized in order to match the input size of the neural network.</a:t>
+            </a:r>
           </a:p>
         </p:txBody>
       </p:sp>
       <p:pic>
         <p:nvPicPr>
-          <p:cNvPr id="2" name="Immagine 1">
+          <p:cNvPr id="5" name="Immagine 4" descr="Immagine che contiene mappa, testo&#10;&#10;Descrizione generata automaticamente">
             <a:extLst>
               <a:ext uri="{FF2B5EF4-FFF2-40B4-BE49-F238E27FC236}">
-                <a16:creationId xmlns:a16="http://schemas.microsoft.com/office/drawing/2014/main" id="{098D812D-B0F1-400E-B4E9-5BB314BD055D}"/>
+                <a16:creationId xmlns:a16="http://schemas.microsoft.com/office/drawing/2014/main" id="{CA984F47-3541-485D-BA06-7F693C26D219}"/>
               </a:ext>
             </a:extLst>
           </p:cNvPr>
@@ -14445,16 +14970,15 @@
           </p:cNvPicPr>
           <p:nvPr/>
         </p:nvPicPr>
-        <p:blipFill>
+        <p:blipFill rotWithShape="1">
           <a:blip r:embed="rId2"/>
-          <a:stretch>
-            <a:fillRect/>
-          </a:stretch>
+          <a:srcRect t="2718" r="26187" b="79232"/>
+          <a:stretch/>
         </p:blipFill>
         <p:spPr>
           <a:xfrm>
-            <a:off x="1363939" y="1220281"/>
-            <a:ext cx="6416118" cy="5034800"/>
+            <a:off x="440189" y="2573079"/>
+            <a:ext cx="8374875" cy="3835398"/>
           </a:xfrm>
           <a:prstGeom prst="rect">
             <a:avLst/>
@@ -14464,7 +14988,7 @@
     </p:spTree>
     <p:extLst>
       <p:ext uri="{BB962C8B-B14F-4D97-AF65-F5344CB8AC3E}">
-        <p14:creationId xmlns:p14="http://schemas.microsoft.com/office/powerpoint/2010/main" val="935431774"/>
+        <p14:creationId xmlns:p14="http://schemas.microsoft.com/office/powerpoint/2010/main" val="1514234550"/>
       </p:ext>
     </p:extLst>
   </p:cSld>
@@ -14654,7 +15178,7 @@
                 </a:solidFill>
                 <a:latin typeface="Tw Cen MT" panose="020B0602020104020603" pitchFamily="34" charset="0"/>
               </a:rPr>
-              <a:t>Production Architecture</a:t>
+              <a:t>Example</a:t>
             </a:r>
           </a:p>
         </p:txBody>
@@ -14742,7 +15266,7 @@
                 </a:solidFill>
                 <a:latin typeface="Garamond" panose="02020404030301010803" pitchFamily="18" charset="0"/>
               </a:rPr>
-              <a:t>7</a:t>
+              <a:t>6</a:t>
             </a:r>
             <a:endParaRPr lang="en-US" altLang="it-IT" sz="1800" dirty="0">
               <a:solidFill>
@@ -14946,12 +15470,10 @@
             </a:lvl9pPr>
           </a:lstStyle>
           <a:p>
-            <a:pPr marL="342900" indent="-342900" eaLnBrk="1" hangingPunct="1">
+            <a:pPr eaLnBrk="1" hangingPunct="1">
               <a:spcBef>
                 <a:spcPct val="20000"/>
               </a:spcBef>
-              <a:buFont typeface="Arial" panose="020B0604020202020204" pitchFamily="34" charset="0"/>
-              <a:buChar char="•"/>
             </a:pPr>
             <a:endParaRPr lang="en-US" altLang="it-IT" sz="2200" dirty="0">
               <a:solidFill>
@@ -14964,10 +15486,10 @@
       </p:sp>
       <p:pic>
         <p:nvPicPr>
-          <p:cNvPr id="3" name="Immagine 2" descr="Immagine che contiene mappa, testo&#10;&#10;Descrizione generata automaticamente">
+          <p:cNvPr id="2" name="Immagine 1">
             <a:extLst>
               <a:ext uri="{FF2B5EF4-FFF2-40B4-BE49-F238E27FC236}">
-                <a16:creationId xmlns:a16="http://schemas.microsoft.com/office/drawing/2014/main" id="{B806BBAF-5620-423B-81CA-68D66BFD4B75}"/>
+                <a16:creationId xmlns:a16="http://schemas.microsoft.com/office/drawing/2014/main" id="{098D812D-B0F1-400E-B4E9-5BB314BD055D}"/>
               </a:ext>
             </a:extLst>
           </p:cNvPr>
@@ -14976,15 +15498,16 @@
           </p:cNvPicPr>
           <p:nvPr/>
         </p:nvPicPr>
-        <p:blipFill rotWithShape="1">
+        <p:blipFill>
           <a:blip r:embed="rId2"/>
-          <a:srcRect t="26026" b="32662"/>
-          <a:stretch/>
+          <a:stretch>
+            <a:fillRect/>
+          </a:stretch>
         </p:blipFill>
         <p:spPr>
           <a:xfrm>
-            <a:off x="931653" y="1112068"/>
-            <a:ext cx="7010817" cy="5424286"/>
+            <a:off x="1363939" y="1220281"/>
+            <a:ext cx="6416118" cy="5034800"/>
           </a:xfrm>
           <a:prstGeom prst="rect">
             <a:avLst/>
@@ -14994,7 +15517,7 @@
     </p:spTree>
     <p:extLst>
       <p:ext uri="{BB962C8B-B14F-4D97-AF65-F5344CB8AC3E}">
-        <p14:creationId xmlns:p14="http://schemas.microsoft.com/office/powerpoint/2010/main" val="3930370613"/>
+        <p14:creationId xmlns:p14="http://schemas.microsoft.com/office/powerpoint/2010/main" val="935431774"/>
       </p:ext>
     </p:extLst>
   </p:cSld>

</xml_diff>